<commit_message>
Atualização da aula 5
</commit_message>
<xml_diff>
--- a/apresentacoes/Aula1/Etapa6-GenericsEmJava/Etapa6.pptx
+++ b/apresentacoes/Aula1/Etapa6-GenericsEmJava/Etapa6.pptx
@@ -6,7 +6,7 @@
     <p:sldMasterId id="2147483655" r:id="rId2"/>
   </p:sldMasterIdLst>
   <p:notesMasterIdLst>
-    <p:notesMasterId r:id="rId13"/>
+    <p:notesMasterId r:id="rId14"/>
   </p:notesMasterIdLst>
   <p:sldIdLst>
     <p:sldId id="258" r:id="rId3"/>
@@ -15,34 +15,35 @@
     <p:sldId id="259" r:id="rId6"/>
     <p:sldId id="277" r:id="rId7"/>
     <p:sldId id="281" r:id="rId8"/>
-    <p:sldId id="282" r:id="rId9"/>
-    <p:sldId id="280" r:id="rId10"/>
-    <p:sldId id="262" r:id="rId11"/>
-    <p:sldId id="284" r:id="rId12"/>
+    <p:sldId id="285" r:id="rId9"/>
+    <p:sldId id="282" r:id="rId10"/>
+    <p:sldId id="280" r:id="rId11"/>
+    <p:sldId id="262" r:id="rId12"/>
+    <p:sldId id="284" r:id="rId13"/>
   </p:sldIdLst>
   <p:sldSz cx="9144000" cy="5143500" type="screen16x9"/>
   <p:notesSz cx="6858000" cy="9144000"/>
   <p:embeddedFontLst>
     <p:embeddedFont>
       <p:font typeface="Calibri" panose="020F0502020204030204" pitchFamily="34" charset="0"/>
-      <p:regular r:id="rId14"/>
-      <p:bold r:id="rId15"/>
-      <p:italic r:id="rId16"/>
-      <p:boldItalic r:id="rId17"/>
+      <p:regular r:id="rId15"/>
+      <p:bold r:id="rId16"/>
+      <p:italic r:id="rId17"/>
+      <p:boldItalic r:id="rId18"/>
     </p:embeddedFont>
     <p:embeddedFont>
       <p:font typeface="Century Gothic" panose="020B0502020202020204" pitchFamily="34" charset="0"/>
-      <p:regular r:id="rId18"/>
-      <p:bold r:id="rId19"/>
-      <p:italic r:id="rId20"/>
-      <p:boldItalic r:id="rId21"/>
+      <p:regular r:id="rId19"/>
+      <p:bold r:id="rId20"/>
+      <p:italic r:id="rId21"/>
+      <p:boldItalic r:id="rId22"/>
     </p:embeddedFont>
     <p:embeddedFont>
       <p:font typeface="Proxima Nova" panose="020B0604020202020204" charset="0"/>
-      <p:regular r:id="rId22"/>
-      <p:bold r:id="rId23"/>
-      <p:italic r:id="rId24"/>
-      <p:boldItalic r:id="rId25"/>
+      <p:regular r:id="rId23"/>
+      <p:bold r:id="rId24"/>
+      <p:italic r:id="rId25"/>
+      <p:boldItalic r:id="rId26"/>
     </p:embeddedFont>
   </p:embeddedFontLst>
   <p:defaultTextStyle>
@@ -290,7 +291,7 @@
       </p15:sldGuideLst>
     </p:ext>
     <p:ext uri="http://customooxmlschemas.google.com/">
-      <go:slidesCustomData xmlns="" xmlns:mc="http://schemas.openxmlformats.org/markup-compatibility/2006" xmlns:mv="urn:schemas-microsoft-com:mac:vml" xmlns:c="http://schemas.openxmlformats.org/drawingml/2006/chart" xmlns:dgm="http://schemas.openxmlformats.org/drawingml/2006/diagram" xmlns:o="urn:schemas-microsoft-com:office:office" xmlns:v="urn:schemas-microsoft-com:vml" xmlns:pvml="urn:schemas-microsoft-com:office:powerpoint" xmlns:com="http://schemas.openxmlformats.org/drawingml/2006/compatibility" xmlns:p14="http://schemas.microsoft.com/office/powerpoint/2010/main" xmlns:p15="http://schemas.microsoft.com/office/powerpoint/2012/main" xmlns:ahyp="http://schemas.microsoft.com/office/drawing/2018/hyperlinkcolor" xmlns:go="http://customooxmlschemas.google.com/" r:id="rId34" roundtripDataSignature="AMtx7mij1fsZUe5V3lBG5qQcqOvrI5UhJw=="/>
+      <go:slidesCustomData xmlns:go="http://customooxmlschemas.google.com/" xmlns:ahyp="http://schemas.microsoft.com/office/drawing/2018/hyperlinkcolor" xmlns:p15="http://schemas.microsoft.com/office/powerpoint/2012/main" xmlns:p14="http://schemas.microsoft.com/office/powerpoint/2010/main" xmlns:com="http://schemas.openxmlformats.org/drawingml/2006/compatibility" xmlns:pvml="urn:schemas-microsoft-com:office:powerpoint" xmlns:v="urn:schemas-microsoft-com:vml" xmlns:o="urn:schemas-microsoft-com:office:office" xmlns:dgm="http://schemas.openxmlformats.org/drawingml/2006/diagram" xmlns:c="http://schemas.openxmlformats.org/drawingml/2006/chart" xmlns:mv="urn:schemas-microsoft-com:mac:vml" xmlns:mc="http://schemas.openxmlformats.org/markup-compatibility/2006" xmlns="" r:id="rId34" roundtripDataSignature="AMtx7mij1fsZUe5V3lBG5qQcqOvrI5UhJw=="/>
     </p:ext>
   </p:extLst>
 </p:presentation>
@@ -1006,6 +1007,136 @@
   <p:cSld>
     <p:spTree>
       <p:nvGrpSpPr>
+        <p:cNvPr id="1" name="Shape 161"/>
+        <p:cNvGrpSpPr/>
+        <p:nvPr/>
+      </p:nvGrpSpPr>
+      <p:grpSpPr>
+        <a:xfrm>
+          <a:off x="0" y="0"/>
+          <a:ext cx="0" cy="0"/>
+          <a:chOff x="0" y="0"/>
+          <a:chExt cx="0" cy="0"/>
+        </a:xfrm>
+      </p:grpSpPr>
+      <p:sp>
+        <p:nvSpPr>
+          <p:cNvPr id="162" name="Google Shape;162;p14:notes"/>
+          <p:cNvSpPr>
+            <a:spLocks noGrp="1" noRot="1" noChangeAspect="1"/>
+          </p:cNvSpPr>
+          <p:nvPr>
+            <p:ph type="sldImg" idx="2"/>
+          </p:nvPr>
+        </p:nvSpPr>
+        <p:spPr>
+          <a:xfrm>
+            <a:off x="381000" y="685800"/>
+            <a:ext cx="6096000" cy="3429000"/>
+          </a:xfrm>
+          <a:custGeom>
+            <a:avLst/>
+            <a:gdLst/>
+            <a:ahLst/>
+            <a:cxnLst/>
+            <a:rect l="l" t="t" r="r" b="b"/>
+            <a:pathLst>
+              <a:path w="120000" h="120000" extrusionOk="0">
+                <a:moveTo>
+                  <a:pt x="0" y="0"/>
+                </a:moveTo>
+                <a:lnTo>
+                  <a:pt x="120000" y="0"/>
+                </a:lnTo>
+                <a:lnTo>
+                  <a:pt x="120000" y="120000"/>
+                </a:lnTo>
+                <a:lnTo>
+                  <a:pt x="0" y="120000"/>
+                </a:lnTo>
+                <a:close/>
+              </a:path>
+            </a:pathLst>
+          </a:custGeom>
+          <a:noFill/>
+          <a:ln w="9525" cap="flat" cmpd="sng">
+            <a:solidFill>
+              <a:srgbClr val="000000"/>
+            </a:solidFill>
+            <a:prstDash val="solid"/>
+            <a:round/>
+            <a:headEnd type="none" w="sm" len="sm"/>
+            <a:tailEnd type="none" w="sm" len="sm"/>
+          </a:ln>
+        </p:spPr>
+      </p:sp>
+      <p:sp>
+        <p:nvSpPr>
+          <p:cNvPr id="163" name="Google Shape;163;p14:notes"/>
+          <p:cNvSpPr txBox="1">
+            <a:spLocks noGrp="1"/>
+          </p:cNvSpPr>
+          <p:nvPr>
+            <p:ph type="body" idx="1"/>
+          </p:nvPr>
+        </p:nvSpPr>
+        <p:spPr>
+          <a:xfrm>
+            <a:off x="685800" y="4343400"/>
+            <a:ext cx="5486400" cy="4114800"/>
+          </a:xfrm>
+          <a:prstGeom prst="rect">
+            <a:avLst/>
+          </a:prstGeom>
+          <a:noFill/>
+          <a:ln>
+            <a:noFill/>
+          </a:ln>
+        </p:spPr>
+        <p:txBody>
+          <a:bodyPr spcFirstLastPara="1" wrap="square" lIns="91425" tIns="91425" rIns="91425" bIns="91425" anchor="t" anchorCtr="0">
+            <a:noAutofit/>
+          </a:bodyPr>
+          <a:lstStyle/>
+          <a:p>
+            <a:pPr marL="0" lvl="0" indent="0" algn="l" rtl="0">
+              <a:lnSpc>
+                <a:spcPct val="100000"/>
+              </a:lnSpc>
+              <a:spcBef>
+                <a:spcPts val="0"/>
+              </a:spcBef>
+              <a:spcAft>
+                <a:spcPts val="0"/>
+              </a:spcAft>
+              <a:buClr>
+                <a:schemeClr val="dk1"/>
+              </a:buClr>
+              <a:buSzPts val="1100"/>
+              <a:buFont typeface="Arial"/>
+              <a:buNone/>
+            </a:pPr>
+            <a:r>
+              <a:rPr lang="en-US"/>
+              <a:t>como criar o seu programa de uma forma mental, utilizando o computador mais potente do mundo, o nosso cerebro. se vc ainda não sabe programar, vai criar o seu primeiro programa hoje, mesmo sem saber sequer uma linha de codigo. e mesmo que vc já saiba programar, vc vai conseguir fazer um reforço na sua logica. sabe quando acontece aqueles errinhos e vc fica engasgado em algum ponto? essa aula vai ser muito importante pra vc tbm</a:t>
+            </a:r>
+            <a:endParaRPr/>
+          </a:p>
+        </p:txBody>
+      </p:sp>
+    </p:spTree>
+  </p:cSld>
+  <p:clrMapOvr>
+    <a:masterClrMapping/>
+  </p:clrMapOvr>
+</p:notes>
+</file>
+
+<file path=ppt/notesSlides/notesSlide11.xml><?xml version="1.0" encoding="utf-8"?>
+<p:notes xmlns:a="http://schemas.openxmlformats.org/drawingml/2006/main" xmlns:r="http://schemas.openxmlformats.org/officeDocument/2006/relationships" xmlns:p="http://schemas.openxmlformats.org/presentationml/2006/main" showMasterSp="0" showMasterPhAnim="0">
+  <p:cSld>
+    <p:spTree>
+      <p:nvGrpSpPr>
         <p:cNvPr id="1" name="Shape 132"/>
         <p:cNvGrpSpPr/>
         <p:nvPr/>
@@ -1891,14 +2022,14 @@
               <a:buFont typeface="Arial"/>
               <a:buNone/>
             </a:pPr>
-            <a:endParaRPr dirty="0"/>
+            <a:endParaRPr/>
           </a:p>
         </p:txBody>
       </p:sp>
     </p:spTree>
     <p:extLst>
       <p:ext uri="{BB962C8B-B14F-4D97-AF65-F5344CB8AC3E}">
-        <p14:creationId xmlns:p14="http://schemas.microsoft.com/office/powerpoint/2010/main" val="3520701163"/>
+        <p14:creationId xmlns:p14="http://schemas.microsoft.com/office/powerpoint/2010/main" val="3566672075"/>
       </p:ext>
     </p:extLst>
   </p:cSld>
@@ -2022,14 +2153,14 @@
               <a:buFont typeface="Arial"/>
               <a:buNone/>
             </a:pPr>
-            <a:endParaRPr/>
+            <a:endParaRPr dirty="0"/>
           </a:p>
         </p:txBody>
       </p:sp>
     </p:spTree>
     <p:extLst>
       <p:ext uri="{BB962C8B-B14F-4D97-AF65-F5344CB8AC3E}">
-        <p14:creationId xmlns:p14="http://schemas.microsoft.com/office/powerpoint/2010/main" val="3978762814"/>
+        <p14:creationId xmlns:p14="http://schemas.microsoft.com/office/powerpoint/2010/main" val="3520701163"/>
       </p:ext>
     </p:extLst>
   </p:cSld>
@@ -2044,7 +2175,7 @@
   <p:cSld>
     <p:spTree>
       <p:nvGrpSpPr>
-        <p:cNvPr id="1" name="Shape 161"/>
+        <p:cNvPr id="1" name="Shape 132"/>
         <p:cNvGrpSpPr/>
         <p:nvPr/>
       </p:nvGrpSpPr>
@@ -2058,7 +2189,7 @@
       </p:grpSpPr>
       <p:sp>
         <p:nvSpPr>
-          <p:cNvPr id="162" name="Google Shape;162;p14:notes"/>
+          <p:cNvPr id="133" name="Google Shape;133;p16:notes"/>
           <p:cNvSpPr>
             <a:spLocks noGrp="1" noRot="1" noChangeAspect="1"/>
           </p:cNvSpPr>
@@ -2109,7 +2240,7 @@
       </p:sp>
       <p:sp>
         <p:nvSpPr>
-          <p:cNvPr id="163" name="Google Shape;163;p14:notes"/>
+          <p:cNvPr id="134" name="Google Shape;134;p16:notes"/>
           <p:cNvSpPr txBox="1">
             <a:spLocks noGrp="1"/>
           </p:cNvSpPr>
@@ -2153,15 +2284,16 @@
               <a:buFont typeface="Arial"/>
               <a:buNone/>
             </a:pPr>
-            <a:r>
-              <a:rPr lang="en-US"/>
-              <a:t>como criar o seu programa de uma forma mental, utilizando o computador mais potente do mundo, o nosso cerebro. se vc ainda não sabe programar, vai criar o seu primeiro programa hoje, mesmo sem saber sequer uma linha de codigo. e mesmo que vc já saiba programar, vc vai conseguir fazer um reforço na sua logica. sabe quando acontece aqueles errinhos e vc fica engasgado em algum ponto? essa aula vai ser muito importante pra vc tbm</a:t>
-            </a:r>
             <a:endParaRPr/>
           </a:p>
         </p:txBody>
       </p:sp>
     </p:spTree>
+    <p:extLst>
+      <p:ext uri="{BB962C8B-B14F-4D97-AF65-F5344CB8AC3E}">
+        <p14:creationId xmlns:p14="http://schemas.microsoft.com/office/powerpoint/2010/main" val="3978762814"/>
+      </p:ext>
+    </p:extLst>
   </p:cSld>
   <p:clrMapOvr>
     <a:masterClrMapping/>
@@ -20975,6 +21107,1007 @@
   <p:cSld>
     <p:spTree>
       <p:nvGrpSpPr>
+        <p:cNvPr id="1" name="Shape 164"/>
+        <p:cNvGrpSpPr/>
+        <p:nvPr/>
+      </p:nvGrpSpPr>
+      <p:grpSpPr>
+        <a:xfrm>
+          <a:off x="0" y="0"/>
+          <a:ext cx="0" cy="0"/>
+          <a:chOff x="0" y="0"/>
+          <a:chExt cx="0" cy="0"/>
+        </a:xfrm>
+      </p:grpSpPr>
+      <p:sp>
+        <p:nvSpPr>
+          <p:cNvPr id="165" name="Google Shape;165;p14"/>
+          <p:cNvSpPr txBox="1">
+            <a:spLocks noGrp="1"/>
+          </p:cNvSpPr>
+          <p:nvPr>
+            <p:ph type="ctrTitle"/>
+          </p:nvPr>
+        </p:nvSpPr>
+        <p:spPr>
+          <a:xfrm>
+            <a:off x="387900" y="3811550"/>
+            <a:ext cx="8520600" cy="201300"/>
+          </a:xfrm>
+          <a:prstGeom prst="rect">
+            <a:avLst/>
+          </a:prstGeom>
+          <a:noFill/>
+          <a:ln>
+            <a:noFill/>
+          </a:ln>
+        </p:spPr>
+        <p:txBody>
+          <a:bodyPr spcFirstLastPara="1" wrap="square" lIns="91425" tIns="91425" rIns="91425" bIns="91425" anchor="ctr" anchorCtr="0">
+            <a:noAutofit/>
+          </a:bodyPr>
+          <a:lstStyle/>
+          <a:p>
+            <a:pPr marL="0" lvl="0" indent="0" algn="l" rtl="0">
+              <a:lnSpc>
+                <a:spcPct val="100000"/>
+              </a:lnSpc>
+              <a:spcBef>
+                <a:spcPts val="7200"/>
+              </a:spcBef>
+              <a:spcAft>
+                <a:spcPts val="0"/>
+              </a:spcAft>
+              <a:buClr>
+                <a:schemeClr val="dk1"/>
+              </a:buClr>
+              <a:buSzPts val="1100"/>
+              <a:buFont typeface="Arial"/>
+              <a:buNone/>
+            </a:pPr>
+            <a:r>
+              <a:rPr lang="en-US" sz="2000">
+                <a:solidFill>
+                  <a:srgbClr val="404040"/>
+                </a:solidFill>
+                <a:latin typeface="Century Gothic"/>
+                <a:ea typeface="Century Gothic"/>
+                <a:cs typeface="Century Gothic"/>
+                <a:sym typeface="Century Gothic"/>
+              </a:rPr>
+              <a:t>[Nome do palestrante]</a:t>
+            </a:r>
+            <a:br>
+              <a:rPr lang="en-US" sz="2000">
+                <a:solidFill>
+                  <a:srgbClr val="404040"/>
+                </a:solidFill>
+                <a:latin typeface="Century Gothic"/>
+                <a:ea typeface="Century Gothic"/>
+                <a:cs typeface="Century Gothic"/>
+                <a:sym typeface="Century Gothic"/>
+              </a:rPr>
+            </a:br>
+            <a:r>
+              <a:rPr lang="en-US" sz="1500">
+                <a:solidFill>
+                  <a:srgbClr val="404040"/>
+                </a:solidFill>
+                <a:latin typeface="Century Gothic"/>
+                <a:ea typeface="Century Gothic"/>
+                <a:cs typeface="Century Gothic"/>
+                <a:sym typeface="Century Gothic"/>
+              </a:rPr>
+              <a:t>[Posição]</a:t>
+            </a:r>
+            <a:endParaRPr sz="1500">
+              <a:solidFill>
+                <a:srgbClr val="404040"/>
+              </a:solidFill>
+              <a:latin typeface="Century Gothic"/>
+              <a:ea typeface="Century Gothic"/>
+              <a:cs typeface="Century Gothic"/>
+              <a:sym typeface="Century Gothic"/>
+            </a:endParaRPr>
+          </a:p>
+        </p:txBody>
+      </p:sp>
+      <p:sp>
+        <p:nvSpPr>
+          <p:cNvPr id="166" name="Google Shape;166;p14"/>
+          <p:cNvSpPr txBox="1">
+            <a:spLocks noGrp="1"/>
+          </p:cNvSpPr>
+          <p:nvPr>
+            <p:ph type="ctrTitle"/>
+          </p:nvPr>
+        </p:nvSpPr>
+        <p:spPr>
+          <a:xfrm>
+            <a:off x="311700" y="756825"/>
+            <a:ext cx="8520600" cy="506400"/>
+          </a:xfrm>
+          <a:prstGeom prst="rect">
+            <a:avLst/>
+          </a:prstGeom>
+          <a:noFill/>
+          <a:ln>
+            <a:noFill/>
+          </a:ln>
+        </p:spPr>
+        <p:txBody>
+          <a:bodyPr spcFirstLastPara="1" wrap="square" lIns="91425" tIns="91425" rIns="91425" bIns="91425" anchor="ctr" anchorCtr="0">
+            <a:noAutofit/>
+          </a:bodyPr>
+          <a:lstStyle/>
+          <a:p>
+            <a:pPr marL="0" lvl="0" indent="0" algn="l" rtl="0">
+              <a:lnSpc>
+                <a:spcPct val="100000"/>
+              </a:lnSpc>
+              <a:spcBef>
+                <a:spcPts val="7200"/>
+              </a:spcBef>
+              <a:spcAft>
+                <a:spcPts val="0"/>
+              </a:spcAft>
+              <a:buClr>
+                <a:schemeClr val="dk1"/>
+              </a:buClr>
+              <a:buSzPts val="1100"/>
+              <a:buFont typeface="Arial"/>
+              <a:buNone/>
+            </a:pPr>
+            <a:r>
+              <a:rPr lang="en-US" sz="3600">
+                <a:solidFill>
+                  <a:srgbClr val="F78321"/>
+                </a:solidFill>
+                <a:latin typeface="Century Gothic"/>
+                <a:ea typeface="Century Gothic"/>
+                <a:cs typeface="Century Gothic"/>
+                <a:sym typeface="Century Gothic"/>
+              </a:rPr>
+              <a:t>[Nome do curso]</a:t>
+            </a:r>
+            <a:endParaRPr sz="3600">
+              <a:solidFill>
+                <a:srgbClr val="F78321"/>
+              </a:solidFill>
+              <a:latin typeface="Century Gothic"/>
+              <a:ea typeface="Century Gothic"/>
+              <a:cs typeface="Century Gothic"/>
+              <a:sym typeface="Century Gothic"/>
+            </a:endParaRPr>
+          </a:p>
+        </p:txBody>
+      </p:sp>
+      <p:sp>
+        <p:nvSpPr>
+          <p:cNvPr id="167" name="Google Shape;167;p14"/>
+          <p:cNvSpPr txBox="1">
+            <a:spLocks noGrp="1"/>
+          </p:cNvSpPr>
+          <p:nvPr>
+            <p:ph type="subTitle" idx="1"/>
+          </p:nvPr>
+        </p:nvSpPr>
+        <p:spPr>
+          <a:xfrm>
+            <a:off x="311700" y="1828950"/>
+            <a:ext cx="8520600" cy="133800"/>
+          </a:xfrm>
+          <a:prstGeom prst="rect">
+            <a:avLst/>
+          </a:prstGeom>
+          <a:noFill/>
+          <a:ln>
+            <a:noFill/>
+          </a:ln>
+        </p:spPr>
+        <p:txBody>
+          <a:bodyPr spcFirstLastPara="1" wrap="square" lIns="91425" tIns="91425" rIns="91425" bIns="91425" anchor="ctr" anchorCtr="0">
+            <a:noAutofit/>
+          </a:bodyPr>
+          <a:lstStyle/>
+          <a:p>
+            <a:pPr marL="0" lvl="0" indent="0" algn="l" rtl="0">
+              <a:lnSpc>
+                <a:spcPct val="100000"/>
+              </a:lnSpc>
+              <a:spcBef>
+                <a:spcPts val="7200"/>
+              </a:spcBef>
+              <a:spcAft>
+                <a:spcPts val="0"/>
+              </a:spcAft>
+              <a:buClr>
+                <a:schemeClr val="dk1"/>
+              </a:buClr>
+              <a:buSzPts val="1100"/>
+              <a:buFont typeface="Arial"/>
+              <a:buNone/>
+            </a:pPr>
+            <a:r>
+              <a:rPr lang="en-US" sz="6600" b="1">
+                <a:solidFill>
+                  <a:srgbClr val="404040"/>
+                </a:solidFill>
+                <a:latin typeface="Century Gothic"/>
+                <a:ea typeface="Century Gothic"/>
+                <a:cs typeface="Century Gothic"/>
+                <a:sym typeface="Century Gothic"/>
+              </a:rPr>
+              <a:t>[Nome da aula]</a:t>
+            </a:r>
+            <a:endParaRPr sz="6600" b="1">
+              <a:solidFill>
+                <a:srgbClr val="404040"/>
+              </a:solidFill>
+              <a:latin typeface="Century Gothic"/>
+              <a:ea typeface="Century Gothic"/>
+              <a:cs typeface="Century Gothic"/>
+              <a:sym typeface="Century Gothic"/>
+            </a:endParaRPr>
+          </a:p>
+        </p:txBody>
+      </p:sp>
+      <p:sp>
+        <p:nvSpPr>
+          <p:cNvPr id="168" name="Google Shape;168;p14"/>
+          <p:cNvSpPr/>
+          <p:nvPr/>
+        </p:nvSpPr>
+        <p:spPr>
+          <a:xfrm>
+            <a:off x="465750" y="3872065"/>
+            <a:ext cx="447600" cy="57300"/>
+          </a:xfrm>
+          <a:prstGeom prst="rect">
+            <a:avLst/>
+          </a:prstGeom>
+          <a:solidFill>
+            <a:srgbClr val="F78321"/>
+          </a:solidFill>
+          <a:ln w="9525" cap="flat" cmpd="sng">
+            <a:solidFill>
+              <a:srgbClr val="F78321"/>
+            </a:solidFill>
+            <a:prstDash val="solid"/>
+            <a:round/>
+            <a:headEnd type="none" w="sm" len="sm"/>
+            <a:tailEnd type="none" w="sm" len="sm"/>
+          </a:ln>
+        </p:spPr>
+        <p:txBody>
+          <a:bodyPr spcFirstLastPara="1" wrap="square" lIns="91425" tIns="91425" rIns="91425" bIns="91425" anchor="ctr" anchorCtr="0">
+            <a:noAutofit/>
+          </a:bodyPr>
+          <a:lstStyle/>
+          <a:p>
+            <a:pPr marL="0" marR="0" lvl="0" indent="0" algn="l" rtl="0">
+              <a:lnSpc>
+                <a:spcPct val="100000"/>
+              </a:lnSpc>
+              <a:spcBef>
+                <a:spcPts val="0"/>
+              </a:spcBef>
+              <a:spcAft>
+                <a:spcPts val="0"/>
+              </a:spcAft>
+              <a:buClr>
+                <a:srgbClr val="000000"/>
+              </a:buClr>
+              <a:buSzPts val="1400"/>
+              <a:buFont typeface="Arial"/>
+              <a:buNone/>
+            </a:pPr>
+            <a:endParaRPr sz="1400" b="0" i="0" u="none" strike="noStrike" cap="none">
+              <a:solidFill>
+                <a:srgbClr val="000000"/>
+              </a:solidFill>
+              <a:latin typeface="Arial"/>
+              <a:ea typeface="Arial"/>
+              <a:cs typeface="Arial"/>
+              <a:sym typeface="Arial"/>
+            </a:endParaRPr>
+          </a:p>
+        </p:txBody>
+      </p:sp>
+      <p:sp>
+        <p:nvSpPr>
+          <p:cNvPr id="169" name="Google Shape;169;p14"/>
+          <p:cNvSpPr/>
+          <p:nvPr/>
+        </p:nvSpPr>
+        <p:spPr>
+          <a:xfrm>
+            <a:off x="0" y="57301"/>
+            <a:ext cx="9144000" cy="5086050"/>
+          </a:xfrm>
+          <a:prstGeom prst="rect">
+            <a:avLst/>
+          </a:prstGeom>
+          <a:solidFill>
+            <a:srgbClr val="404040"/>
+          </a:solidFill>
+          <a:ln w="9525" cap="flat" cmpd="sng">
+            <a:solidFill>
+              <a:srgbClr val="404040"/>
+            </a:solidFill>
+            <a:prstDash val="solid"/>
+            <a:round/>
+            <a:headEnd type="none" w="sm" len="sm"/>
+            <a:tailEnd type="none" w="sm" len="sm"/>
+          </a:ln>
+        </p:spPr>
+        <p:txBody>
+          <a:bodyPr spcFirstLastPara="1" wrap="square" lIns="91425" tIns="91425" rIns="91425" bIns="91425" anchor="ctr" anchorCtr="0">
+            <a:noAutofit/>
+          </a:bodyPr>
+          <a:lstStyle/>
+          <a:p>
+            <a:pPr marL="0" marR="0" lvl="0" indent="0" algn="l" rtl="0">
+              <a:lnSpc>
+                <a:spcPct val="100000"/>
+              </a:lnSpc>
+              <a:spcBef>
+                <a:spcPts val="0"/>
+              </a:spcBef>
+              <a:spcAft>
+                <a:spcPts val="0"/>
+              </a:spcAft>
+              <a:buClr>
+                <a:srgbClr val="000000"/>
+              </a:buClr>
+              <a:buSzPts val="1400"/>
+              <a:buFont typeface="Arial"/>
+              <a:buNone/>
+            </a:pPr>
+            <a:endParaRPr sz="1400" b="0" i="0" u="none" strike="noStrike" cap="none">
+              <a:solidFill>
+                <a:srgbClr val="000000"/>
+              </a:solidFill>
+              <a:latin typeface="Arial"/>
+              <a:ea typeface="Arial"/>
+              <a:cs typeface="Arial"/>
+              <a:sym typeface="Arial"/>
+            </a:endParaRPr>
+          </a:p>
+        </p:txBody>
+      </p:sp>
+      <p:sp>
+        <p:nvSpPr>
+          <p:cNvPr id="170" name="Google Shape;170;p14"/>
+          <p:cNvSpPr/>
+          <p:nvPr/>
+        </p:nvSpPr>
+        <p:spPr>
+          <a:xfrm>
+            <a:off x="0" y="0"/>
+            <a:ext cx="9144000" cy="57300"/>
+          </a:xfrm>
+          <a:prstGeom prst="rect">
+            <a:avLst/>
+          </a:prstGeom>
+          <a:solidFill>
+            <a:srgbClr val="F78321"/>
+          </a:solidFill>
+          <a:ln w="9525" cap="flat" cmpd="sng">
+            <a:solidFill>
+              <a:srgbClr val="F78321"/>
+            </a:solidFill>
+            <a:prstDash val="solid"/>
+            <a:round/>
+            <a:headEnd type="none" w="sm" len="sm"/>
+            <a:tailEnd type="none" w="sm" len="sm"/>
+          </a:ln>
+        </p:spPr>
+        <p:txBody>
+          <a:bodyPr spcFirstLastPara="1" wrap="square" lIns="91425" tIns="91425" rIns="91425" bIns="91425" anchor="ctr" anchorCtr="0">
+            <a:noAutofit/>
+          </a:bodyPr>
+          <a:lstStyle/>
+          <a:p>
+            <a:pPr marL="0" marR="0" lvl="0" indent="0" algn="l" rtl="0">
+              <a:lnSpc>
+                <a:spcPct val="100000"/>
+              </a:lnSpc>
+              <a:spcBef>
+                <a:spcPts val="0"/>
+              </a:spcBef>
+              <a:spcAft>
+                <a:spcPts val="0"/>
+              </a:spcAft>
+              <a:buClr>
+                <a:srgbClr val="000000"/>
+              </a:buClr>
+              <a:buSzPts val="1400"/>
+              <a:buFont typeface="Arial"/>
+              <a:buNone/>
+            </a:pPr>
+            <a:endParaRPr sz="1400" b="0" i="0" u="none" strike="noStrike" cap="none">
+              <a:solidFill>
+                <a:srgbClr val="000000"/>
+              </a:solidFill>
+              <a:latin typeface="Arial"/>
+              <a:ea typeface="Arial"/>
+              <a:cs typeface="Arial"/>
+              <a:sym typeface="Arial"/>
+            </a:endParaRPr>
+          </a:p>
+        </p:txBody>
+      </p:sp>
+      <p:pic>
+        <p:nvPicPr>
+          <p:cNvPr id="171" name="Google Shape;171;p14"/>
+          <p:cNvPicPr preferRelativeResize="0"/>
+          <p:nvPr/>
+        </p:nvPicPr>
+        <p:blipFill rotWithShape="1">
+          <a:blip r:embed="rId3">
+            <a:alphaModFix/>
+          </a:blip>
+          <a:srcRect/>
+          <a:stretch/>
+        </p:blipFill>
+        <p:spPr>
+          <a:xfrm>
+            <a:off x="311700" y="260014"/>
+            <a:ext cx="1698849" cy="591371"/>
+          </a:xfrm>
+          <a:prstGeom prst="rect">
+            <a:avLst/>
+          </a:prstGeom>
+          <a:noFill/>
+          <a:ln>
+            <a:noFill/>
+          </a:ln>
+        </p:spPr>
+      </p:pic>
+      <p:sp>
+        <p:nvSpPr>
+          <p:cNvPr id="172" name="Google Shape;172;p14"/>
+          <p:cNvSpPr/>
+          <p:nvPr/>
+        </p:nvSpPr>
+        <p:spPr>
+          <a:xfrm>
+            <a:off x="0" y="4839750"/>
+            <a:ext cx="9144000" cy="303600"/>
+          </a:xfrm>
+          <a:prstGeom prst="rect">
+            <a:avLst/>
+          </a:prstGeom>
+          <a:solidFill>
+            <a:schemeClr val="lt1"/>
+          </a:solidFill>
+          <a:ln w="9525" cap="flat" cmpd="sng">
+            <a:solidFill>
+              <a:schemeClr val="lt1"/>
+            </a:solidFill>
+            <a:prstDash val="solid"/>
+            <a:round/>
+            <a:headEnd type="none" w="sm" len="sm"/>
+            <a:tailEnd type="none" w="sm" len="sm"/>
+          </a:ln>
+        </p:spPr>
+        <p:txBody>
+          <a:bodyPr spcFirstLastPara="1" wrap="square" lIns="91425" tIns="91425" rIns="91425" bIns="91425" anchor="ctr" anchorCtr="0">
+            <a:noAutofit/>
+          </a:bodyPr>
+          <a:lstStyle/>
+          <a:p>
+            <a:pPr marL="0" marR="0" lvl="0" indent="0" algn="l" rtl="0">
+              <a:lnSpc>
+                <a:spcPct val="100000"/>
+              </a:lnSpc>
+              <a:spcBef>
+                <a:spcPts val="0"/>
+              </a:spcBef>
+              <a:spcAft>
+                <a:spcPts val="0"/>
+              </a:spcAft>
+              <a:buClr>
+                <a:srgbClr val="000000"/>
+              </a:buClr>
+              <a:buSzPts val="1400"/>
+              <a:buFont typeface="Arial"/>
+              <a:buNone/>
+            </a:pPr>
+            <a:endParaRPr sz="1400" b="0" i="0" u="none" strike="noStrike" cap="none">
+              <a:solidFill>
+                <a:schemeClr val="lt1"/>
+              </a:solidFill>
+              <a:latin typeface="Arial"/>
+              <a:ea typeface="Arial"/>
+              <a:cs typeface="Arial"/>
+              <a:sym typeface="Arial"/>
+            </a:endParaRPr>
+          </a:p>
+        </p:txBody>
+      </p:sp>
+      <p:sp>
+        <p:nvSpPr>
+          <p:cNvPr id="173" name="Google Shape;173;p14"/>
+          <p:cNvSpPr txBox="1"/>
+          <p:nvPr/>
+        </p:nvSpPr>
+        <p:spPr>
+          <a:xfrm>
+            <a:off x="467550" y="1131590"/>
+            <a:ext cx="8520600" cy="1584176"/>
+          </a:xfrm>
+          <a:prstGeom prst="rect">
+            <a:avLst/>
+          </a:prstGeom>
+          <a:noFill/>
+          <a:ln>
+            <a:noFill/>
+          </a:ln>
+        </p:spPr>
+        <p:txBody>
+          <a:bodyPr spcFirstLastPara="1" wrap="square" lIns="91425" tIns="91425" rIns="91425" bIns="91425" anchor="ctr" anchorCtr="0">
+            <a:noAutofit/>
+          </a:bodyPr>
+          <a:lstStyle/>
+          <a:p>
+            <a:pPr marL="0" marR="0" lvl="0" indent="0" algn="l" rtl="0">
+              <a:lnSpc>
+                <a:spcPct val="100000"/>
+              </a:lnSpc>
+              <a:spcBef>
+                <a:spcPts val="0"/>
+              </a:spcBef>
+              <a:spcAft>
+                <a:spcPts val="0"/>
+              </a:spcAft>
+              <a:buClr>
+                <a:schemeClr val="dk1"/>
+              </a:buClr>
+              <a:buSzPts val="1100"/>
+              <a:buFont typeface="Arial"/>
+              <a:buNone/>
+            </a:pPr>
+            <a:r>
+              <a:rPr lang="en-US" sz="5400" b="1" i="0" u="none" strike="noStrike" cap="none" dirty="0" err="1">
+                <a:solidFill>
+                  <a:schemeClr val="lt1"/>
+                </a:solidFill>
+                <a:latin typeface="Century Gothic"/>
+                <a:ea typeface="Century Gothic"/>
+                <a:cs typeface="Century Gothic"/>
+                <a:sym typeface="Century Gothic"/>
+              </a:rPr>
+              <a:t>Dúvidas</a:t>
+            </a:r>
+            <a:r>
+              <a:rPr lang="en-US" sz="5400" b="1" i="0" u="none" strike="noStrike" cap="none" dirty="0">
+                <a:solidFill>
+                  <a:schemeClr val="lt1"/>
+                </a:solidFill>
+                <a:latin typeface="Century Gothic"/>
+                <a:ea typeface="Century Gothic"/>
+                <a:cs typeface="Century Gothic"/>
+                <a:sym typeface="Century Gothic"/>
+              </a:rPr>
+              <a:t> </a:t>
+            </a:r>
+            <a:r>
+              <a:rPr lang="en-US" sz="5400" b="1" i="0" u="none" strike="noStrike" cap="none" dirty="0" err="1">
+                <a:solidFill>
+                  <a:schemeClr val="lt1"/>
+                </a:solidFill>
+                <a:latin typeface="Century Gothic"/>
+                <a:ea typeface="Century Gothic"/>
+                <a:cs typeface="Century Gothic"/>
+                <a:sym typeface="Century Gothic"/>
+              </a:rPr>
+              <a:t>durante</a:t>
+            </a:r>
+            <a:r>
+              <a:rPr lang="en-US" sz="5400" b="1" i="0" u="none" strike="noStrike" cap="none" dirty="0">
+                <a:solidFill>
+                  <a:schemeClr val="lt1"/>
+                </a:solidFill>
+                <a:latin typeface="Century Gothic"/>
+                <a:ea typeface="Century Gothic"/>
+                <a:cs typeface="Century Gothic"/>
+                <a:sym typeface="Century Gothic"/>
+              </a:rPr>
+              <a:t> o </a:t>
+            </a:r>
+            <a:r>
+              <a:rPr lang="en-US" sz="5400" b="1" i="0" u="none" strike="noStrike" cap="none" dirty="0" err="1">
+                <a:solidFill>
+                  <a:schemeClr val="lt1"/>
+                </a:solidFill>
+                <a:latin typeface="Century Gothic"/>
+                <a:ea typeface="Century Gothic"/>
+                <a:cs typeface="Century Gothic"/>
+                <a:sym typeface="Century Gothic"/>
+              </a:rPr>
+              <a:t>curso</a:t>
+            </a:r>
+            <a:r>
+              <a:rPr lang="en-US" sz="5400" b="1" i="0" u="none" strike="noStrike" cap="none" dirty="0">
+                <a:solidFill>
+                  <a:schemeClr val="lt1"/>
+                </a:solidFill>
+                <a:latin typeface="Century Gothic"/>
+                <a:ea typeface="Century Gothic"/>
+                <a:cs typeface="Century Gothic"/>
+                <a:sym typeface="Century Gothic"/>
+              </a:rPr>
+              <a:t>?</a:t>
+            </a:r>
+            <a:endParaRPr sz="5400" b="1" i="0" u="none" strike="noStrike" cap="none" dirty="0">
+              <a:solidFill>
+                <a:schemeClr val="lt1"/>
+              </a:solidFill>
+              <a:latin typeface="Century Gothic"/>
+              <a:ea typeface="Century Gothic"/>
+              <a:cs typeface="Century Gothic"/>
+              <a:sym typeface="Century Gothic"/>
+            </a:endParaRPr>
+          </a:p>
+        </p:txBody>
+      </p:sp>
+      <p:sp>
+        <p:nvSpPr>
+          <p:cNvPr id="174" name="Google Shape;174;p14"/>
+          <p:cNvSpPr txBox="1"/>
+          <p:nvPr/>
+        </p:nvSpPr>
+        <p:spPr>
+          <a:xfrm>
+            <a:off x="311700" y="1333492"/>
+            <a:ext cx="7860700" cy="3182474"/>
+          </a:xfrm>
+          <a:prstGeom prst="rect">
+            <a:avLst/>
+          </a:prstGeom>
+          <a:noFill/>
+          <a:ln>
+            <a:noFill/>
+          </a:ln>
+        </p:spPr>
+        <p:txBody>
+          <a:bodyPr spcFirstLastPara="1" wrap="square" lIns="91425" tIns="91425" rIns="91425" bIns="91425" anchor="ctr" anchorCtr="0">
+            <a:noAutofit/>
+          </a:bodyPr>
+          <a:lstStyle/>
+          <a:p>
+            <a:pPr marL="457200" marR="0" lvl="0" indent="-387350" algn="l" rtl="0">
+              <a:lnSpc>
+                <a:spcPct val="100000"/>
+              </a:lnSpc>
+              <a:spcBef>
+                <a:spcPts val="0"/>
+              </a:spcBef>
+              <a:spcAft>
+                <a:spcPts val="0"/>
+              </a:spcAft>
+              <a:buClr>
+                <a:schemeClr val="dk1"/>
+              </a:buClr>
+              <a:buSzPts val="1100"/>
+              <a:buFont typeface="Courier New"/>
+              <a:buNone/>
+            </a:pPr>
+            <a:endParaRPr sz="2400" b="0" i="0" u="none" strike="noStrike" cap="none">
+              <a:solidFill>
+                <a:schemeClr val="lt1"/>
+              </a:solidFill>
+              <a:latin typeface="Proxima Nova"/>
+              <a:ea typeface="Proxima Nova"/>
+              <a:cs typeface="Proxima Nova"/>
+              <a:sym typeface="Proxima Nova"/>
+            </a:endParaRPr>
+          </a:p>
+        </p:txBody>
+      </p:sp>
+      <p:sp>
+        <p:nvSpPr>
+          <p:cNvPr id="175" name="Google Shape;175;p14"/>
+          <p:cNvSpPr txBox="1"/>
+          <p:nvPr/>
+        </p:nvSpPr>
+        <p:spPr>
+          <a:xfrm>
+            <a:off x="467544" y="2787774"/>
+            <a:ext cx="6192688" cy="1656184"/>
+          </a:xfrm>
+          <a:prstGeom prst="rect">
+            <a:avLst/>
+          </a:prstGeom>
+          <a:noFill/>
+          <a:ln>
+            <a:noFill/>
+          </a:ln>
+        </p:spPr>
+        <p:txBody>
+          <a:bodyPr spcFirstLastPara="1" wrap="square" lIns="91425" tIns="91425" rIns="91425" bIns="91425" anchor="ctr" anchorCtr="0">
+            <a:noAutofit/>
+          </a:bodyPr>
+          <a:lstStyle/>
+          <a:p>
+            <a:pPr marL="0" marR="0" lvl="0" indent="0" algn="l" rtl="0">
+              <a:lnSpc>
+                <a:spcPct val="100000"/>
+              </a:lnSpc>
+              <a:spcBef>
+                <a:spcPts val="0"/>
+              </a:spcBef>
+              <a:spcAft>
+                <a:spcPts val="0"/>
+              </a:spcAft>
+              <a:buNone/>
+            </a:pPr>
+            <a:r>
+              <a:rPr lang="en-US" sz="2800" b="0" i="0" u="sng" strike="noStrike" cap="none" dirty="0">
+                <a:solidFill>
+                  <a:srgbClr val="F78321"/>
+                </a:solidFill>
+                <a:latin typeface="Century Gothic"/>
+                <a:ea typeface="Century Gothic"/>
+                <a:cs typeface="Century Gothic"/>
+                <a:sym typeface="Century Gothic"/>
+              </a:rPr>
+              <a:t>&gt; </a:t>
+            </a:r>
+            <a:r>
+              <a:rPr lang="en-US" sz="2800" b="0" i="0" u="sng" strike="noStrike" cap="none" dirty="0" err="1">
+                <a:solidFill>
+                  <a:srgbClr val="F78321"/>
+                </a:solidFill>
+                <a:latin typeface="Century Gothic"/>
+                <a:ea typeface="Century Gothic"/>
+                <a:cs typeface="Century Gothic"/>
+                <a:sym typeface="Century Gothic"/>
+              </a:rPr>
+              <a:t>Fórum</a:t>
+            </a:r>
+            <a:r>
+              <a:rPr lang="en-US" sz="2800" b="0" i="0" u="sng" strike="noStrike" cap="none" dirty="0">
+                <a:solidFill>
+                  <a:srgbClr val="F78321"/>
+                </a:solidFill>
+                <a:latin typeface="Century Gothic"/>
+                <a:ea typeface="Century Gothic"/>
+                <a:cs typeface="Century Gothic"/>
+                <a:sym typeface="Century Gothic"/>
+              </a:rPr>
+              <a:t> do </a:t>
+            </a:r>
+            <a:r>
+              <a:rPr lang="en-US" sz="2800" b="0" i="0" u="sng" strike="noStrike" cap="none" dirty="0" err="1">
+                <a:solidFill>
+                  <a:srgbClr val="F78321"/>
+                </a:solidFill>
+                <a:latin typeface="Century Gothic"/>
+                <a:ea typeface="Century Gothic"/>
+                <a:cs typeface="Century Gothic"/>
+                <a:sym typeface="Century Gothic"/>
+              </a:rPr>
+              <a:t>curso</a:t>
+            </a:r>
+            <a:endParaRPr u="sng" dirty="0"/>
+          </a:p>
+          <a:p>
+            <a:pPr marL="0" marR="0" lvl="0" indent="0" algn="l" rtl="0">
+              <a:lnSpc>
+                <a:spcPct val="100000"/>
+              </a:lnSpc>
+              <a:spcBef>
+                <a:spcPts val="0"/>
+              </a:spcBef>
+              <a:spcAft>
+                <a:spcPts val="0"/>
+              </a:spcAft>
+              <a:buNone/>
+            </a:pPr>
+            <a:r>
+              <a:rPr lang="en-US" sz="2800" b="0" i="0" u="sng" strike="noStrike" cap="none" dirty="0">
+                <a:solidFill>
+                  <a:srgbClr val="F78321"/>
+                </a:solidFill>
+                <a:latin typeface="Century Gothic"/>
+                <a:ea typeface="Century Gothic"/>
+                <a:cs typeface="Century Gothic"/>
+                <a:sym typeface="Century Gothic"/>
+              </a:rPr>
+              <a:t>&gt; </a:t>
+            </a:r>
+            <a:r>
+              <a:rPr lang="en-US" sz="2800" b="0" i="0" u="sng" strike="noStrike" cap="none" dirty="0" err="1">
+                <a:solidFill>
+                  <a:srgbClr val="F78321"/>
+                </a:solidFill>
+                <a:latin typeface="Century Gothic"/>
+                <a:ea typeface="Century Gothic"/>
+                <a:cs typeface="Century Gothic"/>
+                <a:sym typeface="Century Gothic"/>
+              </a:rPr>
+              <a:t>Comunidade</a:t>
+            </a:r>
+            <a:r>
+              <a:rPr lang="en-US" sz="2800" b="0" i="0" u="sng" strike="noStrike" cap="none" dirty="0">
+                <a:solidFill>
+                  <a:srgbClr val="F78321"/>
+                </a:solidFill>
+                <a:latin typeface="Century Gothic"/>
+                <a:ea typeface="Century Gothic"/>
+                <a:cs typeface="Century Gothic"/>
+                <a:sym typeface="Century Gothic"/>
+              </a:rPr>
+              <a:t> </a:t>
+            </a:r>
+            <a:r>
+              <a:rPr lang="en-US" sz="2800" b="0" i="0" u="sng" strike="noStrike" cap="none" dirty="0">
+                <a:solidFill>
+                  <a:srgbClr val="F78321"/>
+                </a:solidFill>
+                <a:latin typeface="Century Gothic"/>
+                <a:ea typeface="Century Gothic"/>
+                <a:cs typeface="Century Gothic"/>
+                <a:sym typeface="Century Gothic"/>
+                <a:hlinkClick r:id="rId4">
+                  <a:extLst>
+                    <a:ext uri="{A12FA001-AC4F-418D-AE19-62706E023703}">
+                      <ahyp:hlinkClr xmlns:ahyp="http://schemas.microsoft.com/office/drawing/2018/hyperlinkcolor" val="tx"/>
+                    </a:ext>
+                  </a:extLst>
+                </a:hlinkClick>
+              </a:rPr>
+              <a:t>online (discord)</a:t>
+            </a:r>
+            <a:endParaRPr sz="2800" b="0" i="0" u="sng" strike="noStrike" cap="none" dirty="0">
+              <a:solidFill>
+                <a:srgbClr val="F78321"/>
+              </a:solidFill>
+              <a:latin typeface="Century Gothic"/>
+              <a:ea typeface="Century Gothic"/>
+              <a:cs typeface="Century Gothic"/>
+              <a:sym typeface="Century Gothic"/>
+            </a:endParaRPr>
+          </a:p>
+        </p:txBody>
+      </p:sp>
+      <p:pic>
+        <p:nvPicPr>
+          <p:cNvPr id="7" name="Imagem 6">
+            <a:extLst>
+              <a:ext uri="{FF2B5EF4-FFF2-40B4-BE49-F238E27FC236}">
+                <a16:creationId xmlns:a16="http://schemas.microsoft.com/office/drawing/2014/main" id="{7AEB64A7-0235-496B-88BD-C863AAD3C8E1}"/>
+              </a:ext>
+            </a:extLst>
+          </p:cNvPr>
+          <p:cNvPicPr>
+            <a:picLocks noChangeAspect="1"/>
+          </p:cNvPicPr>
+          <p:nvPr/>
+        </p:nvPicPr>
+        <p:blipFill>
+          <a:blip r:embed="rId5"/>
+          <a:stretch>
+            <a:fillRect/>
+          </a:stretch>
+        </p:blipFill>
+        <p:spPr>
+          <a:xfrm>
+            <a:off x="7196362" y="90385"/>
+            <a:ext cx="1938293" cy="2349447"/>
+          </a:xfrm>
+          <a:prstGeom prst="rect">
+            <a:avLst/>
+          </a:prstGeom>
+        </p:spPr>
+      </p:pic>
+    </p:spTree>
+  </p:cSld>
+  <p:clrMapOvr>
+    <a:masterClrMapping/>
+  </p:clrMapOvr>
+  <mc:AlternateContent xmlns:mc="http://schemas.openxmlformats.org/markup-compatibility/2006" xmlns:p14="http://schemas.microsoft.com/office/powerpoint/2010/main">
+    <mc:Choice Requires="p14">
+      <p:transition spd="med" p14:dur="700">
+        <p:fade/>
+      </p:transition>
+    </mc:Choice>
+    <mc:Fallback xmlns:ahyp="http://schemas.microsoft.com/office/drawing/2018/hyperlinkcolor" xmlns:p15="http://schemas.microsoft.com/office/powerpoint/2012/main" xmlns:com="http://schemas.openxmlformats.org/drawingml/2006/compatibility" xmlns:pvml="urn:schemas-microsoft-com:office:powerpoint" xmlns:v="urn:schemas-microsoft-com:vml" xmlns:o="urn:schemas-microsoft-com:office:office" xmlns:dgm="http://schemas.openxmlformats.org/drawingml/2006/diagram" xmlns:c="http://schemas.openxmlformats.org/drawingml/2006/chart" xmlns:mv="urn:schemas-microsoft-com:mac:vml" xmlns="">
+      <p:transition spd="slow">
+        <p:fade/>
+      </p:transition>
+    </mc:Fallback>
+  </mc:AlternateContent>
+  <p:timing>
+    <p:tnLst>
+      <p:par>
+        <p:cTn id="1" dur="indefinite" restart="never" nodeType="tmRoot">
+          <p:childTnLst>
+            <p:seq concurrent="1" nextAc="seek">
+              <p:cTn id="2" dur="indefinite" nodeType="mainSeq">
+                <p:childTnLst>
+                  <p:par>
+                    <p:cTn id="3" fill="hold">
+                      <p:stCondLst>
+                        <p:cond delay="indefinite"/>
+                      </p:stCondLst>
+                      <p:childTnLst>
+                        <p:par>
+                          <p:cTn id="4" fill="hold">
+                            <p:stCondLst>
+                              <p:cond delay="0"/>
+                            </p:stCondLst>
+                            <p:childTnLst>
+                              <p:par>
+                                <p:cTn id="5" presetID="1" presetClass="entr" presetSubtype="0" fill="hold" nodeType="clickEffect">
+                                  <p:stCondLst>
+                                    <p:cond delay="0"/>
+                                  </p:stCondLst>
+                                  <p:childTnLst>
+                                    <p:set>
+                                      <p:cBhvr>
+                                        <p:cTn id="6" dur="1" fill="hold">
+                                          <p:stCondLst>
+                                            <p:cond delay="0"/>
+                                          </p:stCondLst>
+                                        </p:cTn>
+                                        <p:tgtEl>
+                                          <p:spTgt spid="174">
+                                            <p:txEl>
+                                              <p:pRg st="0" end="0"/>
+                                            </p:txEl>
+                                          </p:spTgt>
+                                        </p:tgtEl>
+                                        <p:attrNameLst>
+                                          <p:attrName>style.visibility</p:attrName>
+                                        </p:attrNameLst>
+                                      </p:cBhvr>
+                                      <p:to>
+                                        <p:strVal val="visible"/>
+                                      </p:to>
+                                    </p:set>
+                                  </p:childTnLst>
+                                </p:cTn>
+                              </p:par>
+                            </p:childTnLst>
+                          </p:cTn>
+                        </p:par>
+                      </p:childTnLst>
+                    </p:cTn>
+                  </p:par>
+                </p:childTnLst>
+              </p:cTn>
+              <p:prevCondLst>
+                <p:cond evt="onPrev" delay="0">
+                  <p:tgtEl>
+                    <p:sldTgt/>
+                  </p:tgtEl>
+                </p:cond>
+              </p:prevCondLst>
+              <p:nextCondLst>
+                <p:cond evt="onNext" delay="0">
+                  <p:tgtEl>
+                    <p:sldTgt/>
+                  </p:tgtEl>
+                </p:cond>
+              </p:nextCondLst>
+            </p:seq>
+          </p:childTnLst>
+        </p:cTn>
+      </p:par>
+    </p:tnLst>
+  </p:timing>
+</p:sld>
+</file>
+
+<file path=ppt/slides/slide11.xml><?xml version="1.0" encoding="utf-8"?>
+<p:sld xmlns:a="http://schemas.openxmlformats.org/drawingml/2006/main" xmlns:r="http://schemas.openxmlformats.org/officeDocument/2006/relationships" xmlns:p="http://schemas.openxmlformats.org/presentationml/2006/main">
+  <p:cSld>
+    <p:spTree>
+      <p:nvGrpSpPr>
         <p:cNvPr id="1" name="Shape 135"/>
         <p:cNvGrpSpPr/>
         <p:nvPr/>
@@ -21955,7 +23088,7 @@
         <p:fade/>
       </p:transition>
     </mc:Choice>
-    <mc:Fallback xmlns="" xmlns:mv="urn:schemas-microsoft-com:mac:vml" xmlns:c="http://schemas.openxmlformats.org/drawingml/2006/chart" xmlns:dgm="http://schemas.openxmlformats.org/drawingml/2006/diagram" xmlns:o="urn:schemas-microsoft-com:office:office" xmlns:v="urn:schemas-microsoft-com:vml" xmlns:pvml="urn:schemas-microsoft-com:office:powerpoint" xmlns:com="http://schemas.openxmlformats.org/drawingml/2006/compatibility" xmlns:p15="http://schemas.microsoft.com/office/powerpoint/2012/main" xmlns:ahyp="http://schemas.microsoft.com/office/drawing/2018/hyperlinkcolor">
+    <mc:Fallback xmlns:ahyp="http://schemas.microsoft.com/office/drawing/2018/hyperlinkcolor" xmlns:p15="http://schemas.microsoft.com/office/powerpoint/2012/main" xmlns:com="http://schemas.openxmlformats.org/drawingml/2006/compatibility" xmlns:pvml="urn:schemas-microsoft-com:office:powerpoint" xmlns:v="urn:schemas-microsoft-com:vml" xmlns:o="urn:schemas-microsoft-com:office:office" xmlns:dgm="http://schemas.openxmlformats.org/drawingml/2006/diagram" xmlns:c="http://schemas.openxmlformats.org/drawingml/2006/chart" xmlns:mv="urn:schemas-microsoft-com:mac:vml" xmlns="">
       <p:transition spd="slow">
         <p:fade/>
       </p:transition>
@@ -22154,7 +23287,7 @@
         </p:nvSpPr>
         <p:spPr>
           <a:xfrm>
-            <a:off x="311700" y="1435395"/>
+            <a:off x="311700" y="1095153"/>
             <a:ext cx="5259773" cy="461665"/>
           </a:xfrm>
           <a:prstGeom prst="rect">
@@ -22235,7 +23368,7 @@
         </p:nvSpPr>
         <p:spPr>
           <a:xfrm>
-            <a:off x="309042" y="2333226"/>
+            <a:off x="309042" y="1992984"/>
             <a:ext cx="2861681" cy="2308324"/>
           </a:xfrm>
           <a:prstGeom prst="rect">
@@ -22406,7 +23539,7 @@
         </p:nvSpPr>
         <p:spPr>
           <a:xfrm>
-            <a:off x="1378198" y="1145796"/>
+            <a:off x="1378198" y="805554"/>
             <a:ext cx="338067" cy="355848"/>
           </a:xfrm>
           <a:prstGeom prst="downArrow">
@@ -22453,7 +23586,7 @@
         </p:nvSpPr>
         <p:spPr>
           <a:xfrm>
-            <a:off x="2488156" y="1995875"/>
+            <a:off x="2488156" y="1655633"/>
             <a:ext cx="338067" cy="355848"/>
           </a:xfrm>
           <a:prstGeom prst="downArrow">
@@ -22500,14 +23633,113 @@
         </p:nvSpPr>
         <p:spPr>
           <a:xfrm flipH="1">
-            <a:off x="3820633" y="3246441"/>
-            <a:ext cx="5323365" cy="1828026"/>
+            <a:off x="3572410" y="1599342"/>
+            <a:ext cx="5571590" cy="1972060"/>
           </a:xfrm>
-          <a:prstGeom prst="round1Rect">
-            <a:avLst>
-              <a:gd name="adj" fmla="val 8251"/>
-            </a:avLst>
-          </a:prstGeom>
+          <a:custGeom>
+            <a:avLst/>
+            <a:gdLst>
+              <a:gd name="connsiteX0" fmla="*/ 0 w 5323365"/>
+              <a:gd name="connsiteY0" fmla="*/ 0 h 1828026"/>
+              <a:gd name="connsiteX1" fmla="*/ 5172535 w 5323365"/>
+              <a:gd name="connsiteY1" fmla="*/ 0 h 1828026"/>
+              <a:gd name="connsiteX2" fmla="*/ 5323365 w 5323365"/>
+              <a:gd name="connsiteY2" fmla="*/ 150830 h 1828026"/>
+              <a:gd name="connsiteX3" fmla="*/ 5323365 w 5323365"/>
+              <a:gd name="connsiteY3" fmla="*/ 1828026 h 1828026"/>
+              <a:gd name="connsiteX4" fmla="*/ 0 w 5323365"/>
+              <a:gd name="connsiteY4" fmla="*/ 1828026 h 1828026"/>
+              <a:gd name="connsiteX5" fmla="*/ 0 w 5323365"/>
+              <a:gd name="connsiteY5" fmla="*/ 0 h 1828026"/>
+              <a:gd name="connsiteX0" fmla="*/ 0 w 5323365"/>
+              <a:gd name="connsiteY0" fmla="*/ 0 h 1828026"/>
+              <a:gd name="connsiteX1" fmla="*/ 5172535 w 5323365"/>
+              <a:gd name="connsiteY1" fmla="*/ 0 h 1828026"/>
+              <a:gd name="connsiteX2" fmla="*/ 5323365 w 5323365"/>
+              <a:gd name="connsiteY2" fmla="*/ 150830 h 1828026"/>
+              <a:gd name="connsiteX3" fmla="*/ 5323365 w 5323365"/>
+              <a:gd name="connsiteY3" fmla="*/ 1828026 h 1828026"/>
+              <a:gd name="connsiteX4" fmla="*/ 0 w 5323365"/>
+              <a:gd name="connsiteY4" fmla="*/ 1828026 h 1828026"/>
+              <a:gd name="connsiteX5" fmla="*/ 0 w 5323365"/>
+              <a:gd name="connsiteY5" fmla="*/ 0 h 1828026"/>
+              <a:gd name="connsiteX0" fmla="*/ 0 w 5323365"/>
+              <a:gd name="connsiteY0" fmla="*/ 0 h 2317811"/>
+              <a:gd name="connsiteX1" fmla="*/ 5172535 w 5323365"/>
+              <a:gd name="connsiteY1" fmla="*/ 0 h 2317811"/>
+              <a:gd name="connsiteX2" fmla="*/ 5323365 w 5323365"/>
+              <a:gd name="connsiteY2" fmla="*/ 150830 h 2317811"/>
+              <a:gd name="connsiteX3" fmla="*/ 5323365 w 5323365"/>
+              <a:gd name="connsiteY3" fmla="*/ 1828026 h 2317811"/>
+              <a:gd name="connsiteX4" fmla="*/ 0 w 5323365"/>
+              <a:gd name="connsiteY4" fmla="*/ 1828026 h 2317811"/>
+              <a:gd name="connsiteX5" fmla="*/ 0 w 5323365"/>
+              <a:gd name="connsiteY5" fmla="*/ 0 h 2317811"/>
+              <a:gd name="connsiteX0" fmla="*/ 0 w 5571590"/>
+              <a:gd name="connsiteY0" fmla="*/ 0 h 1972060"/>
+              <a:gd name="connsiteX1" fmla="*/ 5172535 w 5571590"/>
+              <a:gd name="connsiteY1" fmla="*/ 0 h 1972060"/>
+              <a:gd name="connsiteX2" fmla="*/ 5323365 w 5571590"/>
+              <a:gd name="connsiteY2" fmla="*/ 150830 h 1972060"/>
+              <a:gd name="connsiteX3" fmla="*/ 5323365 w 5571590"/>
+              <a:gd name="connsiteY3" fmla="*/ 1828026 h 1972060"/>
+              <a:gd name="connsiteX4" fmla="*/ 0 w 5571590"/>
+              <a:gd name="connsiteY4" fmla="*/ 1828026 h 1972060"/>
+              <a:gd name="connsiteX5" fmla="*/ 0 w 5571590"/>
+              <a:gd name="connsiteY5" fmla="*/ 0 h 1972060"/>
+            </a:gdLst>
+            <a:ahLst/>
+            <a:cxnLst>
+              <a:cxn ang="0">
+                <a:pos x="connsiteX0" y="connsiteY0"/>
+              </a:cxn>
+              <a:cxn ang="0">
+                <a:pos x="connsiteX1" y="connsiteY1"/>
+              </a:cxn>
+              <a:cxn ang="0">
+                <a:pos x="connsiteX2" y="connsiteY2"/>
+              </a:cxn>
+              <a:cxn ang="0">
+                <a:pos x="connsiteX3" y="connsiteY3"/>
+              </a:cxn>
+              <a:cxn ang="0">
+                <a:pos x="connsiteX4" y="connsiteY4"/>
+              </a:cxn>
+              <a:cxn ang="0">
+                <a:pos x="connsiteX5" y="connsiteY5"/>
+              </a:cxn>
+            </a:cxnLst>
+            <a:rect l="l" t="t" r="r" b="b"/>
+            <a:pathLst>
+              <a:path w="5571590" h="1972060">
+                <a:moveTo>
+                  <a:pt x="0" y="0"/>
+                </a:moveTo>
+                <a:lnTo>
+                  <a:pt x="5172535" y="0"/>
+                </a:lnTo>
+                <a:cubicBezTo>
+                  <a:pt x="5255836" y="0"/>
+                  <a:pt x="5323365" y="67529"/>
+                  <a:pt x="5323365" y="150830"/>
+                </a:cubicBezTo>
+                <a:cubicBezTo>
+                  <a:pt x="5323365" y="709895"/>
+                  <a:pt x="5881872" y="1803050"/>
+                  <a:pt x="5323365" y="1828026"/>
+                </a:cubicBezTo>
+                <a:cubicBezTo>
+                  <a:pt x="4494025" y="1865113"/>
+                  <a:pt x="887227" y="2132697"/>
+                  <a:pt x="0" y="1828026"/>
+                </a:cubicBezTo>
+                <a:lnTo>
+                  <a:pt x="0" y="0"/>
+                </a:lnTo>
+                <a:close/>
+              </a:path>
+            </a:pathLst>
+          </a:custGeom>
           <a:solidFill>
             <a:srgbClr val="404040"/>
           </a:solidFill>
@@ -22570,7 +23802,7 @@
         </p:nvSpPr>
         <p:spPr>
           <a:xfrm>
-            <a:off x="3943348" y="3315938"/>
+            <a:off x="3943348" y="1614721"/>
             <a:ext cx="1646605" cy="461665"/>
           </a:xfrm>
           <a:prstGeom prst="rect">
@@ -22626,7 +23858,7 @@
         </p:nvSpPr>
         <p:spPr>
           <a:xfrm>
-            <a:off x="3955314" y="3861198"/>
+            <a:off x="3955314" y="2096187"/>
             <a:ext cx="5092994" cy="1200329"/>
           </a:xfrm>
           <a:prstGeom prst="rect">
@@ -22713,7 +23945,7 @@
         <p:fade/>
       </p:transition>
     </mc:Choice>
-    <mc:Fallback xmlns="" xmlns:mv="urn:schemas-microsoft-com:mac:vml" xmlns:c="http://schemas.openxmlformats.org/drawingml/2006/chart" xmlns:dgm="http://schemas.openxmlformats.org/drawingml/2006/diagram" xmlns:o="urn:schemas-microsoft-com:office:office" xmlns:v="urn:schemas-microsoft-com:vml" xmlns:pvml="urn:schemas-microsoft-com:office:powerpoint" xmlns:com="http://schemas.openxmlformats.org/drawingml/2006/compatibility" xmlns:p15="http://schemas.microsoft.com/office/powerpoint/2012/main" xmlns:ahyp="http://schemas.microsoft.com/office/drawing/2018/hyperlinkcolor">
+    <mc:Fallback xmlns:ahyp="http://schemas.microsoft.com/office/drawing/2018/hyperlinkcolor" xmlns:p15="http://schemas.microsoft.com/office/powerpoint/2012/main" xmlns:com="http://schemas.openxmlformats.org/drawingml/2006/compatibility" xmlns:pvml="urn:schemas-microsoft-com:office:powerpoint" xmlns:v="urn:schemas-microsoft-com:vml" xmlns:o="urn:schemas-microsoft-com:office:office" xmlns:dgm="http://schemas.openxmlformats.org/drawingml/2006/diagram" xmlns:c="http://schemas.openxmlformats.org/drawingml/2006/chart" xmlns:mv="urn:schemas-microsoft-com:mac:vml" xmlns="">
       <p:transition spd="slow">
         <p:fade/>
       </p:transition>
@@ -23354,8 +24586,8 @@
         </p:nvSpPr>
         <p:spPr>
           <a:xfrm>
-            <a:off x="311700" y="1371421"/>
-            <a:ext cx="3749040" cy="1200329"/>
+            <a:off x="311699" y="1371421"/>
+            <a:ext cx="8009677" cy="830997"/>
           </a:xfrm>
           <a:prstGeom prst="rect">
             <a:avLst/>
@@ -23384,23 +24616,8 @@
                 <a:latin typeface="Calibri" panose="020F0502020204030204" pitchFamily="34" charset="0"/>
                 <a:cs typeface="Calibri" panose="020F0502020204030204" pitchFamily="34" charset="0"/>
               </a:rPr>
-              <a:t>Unknown Wildcard</a:t>
+              <a:t>Unknown Wildcards (Unbounded)</a:t>
             </a:r>
-          </a:p>
-          <a:p>
-            <a:pPr>
-              <a:buClr>
-                <a:srgbClr val="002060"/>
-              </a:buClr>
-              <a:buSzPct val="97000"/>
-            </a:pPr>
-            <a:endParaRPr lang="en-US" sz="2400" dirty="0">
-              <a:solidFill>
-                <a:srgbClr val="002060"/>
-              </a:solidFill>
-              <a:latin typeface="Calibri" panose="020F0502020204030204" pitchFamily="34" charset="0"/>
-              <a:cs typeface="Calibri" panose="020F0502020204030204" pitchFamily="34" charset="0"/>
-            </a:endParaRPr>
           </a:p>
           <a:p>
             <a:pPr marL="342900" indent="-342900">
@@ -23419,7 +24636,7 @@
                 <a:latin typeface="Calibri" panose="020F0502020204030204" pitchFamily="34" charset="0"/>
                 <a:cs typeface="Calibri" panose="020F0502020204030204" pitchFamily="34" charset="0"/>
               </a:rPr>
-              <a:t>Bounded Wildcard</a:t>
+              <a:t>Bounded Wildcard (Upper Bounded/Lower Bounded)</a:t>
             </a:r>
           </a:p>
         </p:txBody>
@@ -23446,8 +24663,8 @@
         </p:blipFill>
         <p:spPr>
           <a:xfrm>
-            <a:off x="6060990" y="1971585"/>
-            <a:ext cx="3083010" cy="3083010"/>
+            <a:off x="233922" y="2586988"/>
+            <a:ext cx="2483457" cy="2483457"/>
           </a:xfrm>
           <a:prstGeom prst="rect">
             <a:avLst/>
@@ -23468,7 +24685,7 @@
         </p:nvSpPr>
         <p:spPr>
           <a:xfrm>
-            <a:off x="6152380" y="1637295"/>
+            <a:off x="31899" y="2202418"/>
             <a:ext cx="3083010" cy="461665"/>
           </a:xfrm>
           <a:prstGeom prst="rect">
@@ -23560,7 +24777,7 @@
         <p:fade/>
       </p:transition>
     </mc:Choice>
-    <mc:Fallback xmlns="" xmlns:mv="urn:schemas-microsoft-com:mac:vml" xmlns:c="http://schemas.openxmlformats.org/drawingml/2006/chart" xmlns:dgm="http://schemas.openxmlformats.org/drawingml/2006/diagram" xmlns:o="urn:schemas-microsoft-com:office:office" xmlns:v="urn:schemas-microsoft-com:vml" xmlns:pvml="urn:schemas-microsoft-com:office:powerpoint" xmlns:com="http://schemas.openxmlformats.org/drawingml/2006/compatibility" xmlns:p15="http://schemas.microsoft.com/office/powerpoint/2012/main" xmlns:ahyp="http://schemas.microsoft.com/office/drawing/2018/hyperlinkcolor">
+    <mc:Fallback xmlns:ahyp="http://schemas.microsoft.com/office/drawing/2018/hyperlinkcolor" xmlns:p15="http://schemas.microsoft.com/office/powerpoint/2012/main" xmlns:com="http://schemas.openxmlformats.org/drawingml/2006/compatibility" xmlns:pvml="urn:schemas-microsoft-com:office:powerpoint" xmlns:v="urn:schemas-microsoft-com:vml" xmlns:o="urn:schemas-microsoft-com:office:office" xmlns:dgm="http://schemas.openxmlformats.org/drawingml/2006/diagram" xmlns:c="http://schemas.openxmlformats.org/drawingml/2006/chart" xmlns:mv="urn:schemas-microsoft-com:mac:vml" xmlns="">
       <p:transition spd="slow">
         <p:fade/>
       </p:transition>
@@ -24064,14 +25281,24 @@
               <a:buSzPct val="97000"/>
             </a:pPr>
             <a:r>
-              <a:rPr lang="pt-BR" sz="2400" dirty="0">
+              <a:rPr lang="pt-BR" sz="2400" dirty="0" err="1">
                 <a:solidFill>
                   <a:srgbClr val="002060"/>
                 </a:solidFill>
                 <a:latin typeface="Calibri" panose="020F0502020204030204" pitchFamily="34" charset="0"/>
                 <a:cs typeface="Calibri" panose="020F0502020204030204" pitchFamily="34" charset="0"/>
               </a:rPr>
-              <a:t>Lista&lt;Aluno&gt; </a:t>
+              <a:t>List</a:t>
+            </a:r>
+            <a:r>
+              <a:rPr lang="pt-BR" sz="2400" dirty="0">
+                <a:solidFill>
+                  <a:srgbClr val="002060"/>
+                </a:solidFill>
+                <a:latin typeface="Calibri" panose="020F0502020204030204" pitchFamily="34" charset="0"/>
+                <a:cs typeface="Calibri" panose="020F0502020204030204" pitchFamily="34" charset="0"/>
+              </a:rPr>
+              <a:t>&lt;Aluno&gt; </a:t>
             </a:r>
             <a:r>
               <a:rPr lang="pt-BR" sz="2400" dirty="0" err="1">
@@ -24091,7 +25318,27 @@
                 <a:latin typeface="Calibri" panose="020F0502020204030204" pitchFamily="34" charset="0"/>
                 <a:cs typeface="Calibri" panose="020F0502020204030204" pitchFamily="34" charset="0"/>
               </a:rPr>
-              <a:t> = new Lista&lt;Aluno&gt;();</a:t>
+              <a:t> = new </a:t>
+            </a:r>
+            <a:r>
+              <a:rPr lang="pt-BR" sz="2400" dirty="0" err="1">
+                <a:solidFill>
+                  <a:srgbClr val="002060"/>
+                </a:solidFill>
+                <a:latin typeface="Calibri" panose="020F0502020204030204" pitchFamily="34" charset="0"/>
+                <a:cs typeface="Calibri" panose="020F0502020204030204" pitchFamily="34" charset="0"/>
+              </a:rPr>
+              <a:t>List</a:t>
+            </a:r>
+            <a:r>
+              <a:rPr lang="pt-BR" sz="2400" dirty="0">
+                <a:solidFill>
+                  <a:srgbClr val="002060"/>
+                </a:solidFill>
+                <a:latin typeface="Calibri" panose="020F0502020204030204" pitchFamily="34" charset="0"/>
+                <a:cs typeface="Calibri" panose="020F0502020204030204" pitchFamily="34" charset="0"/>
+              </a:rPr>
+              <a:t>&lt;Aluno&gt;();</a:t>
             </a:r>
           </a:p>
           <a:p>
@@ -24160,7 +25407,7 @@
         <p:fade/>
       </p:transition>
     </mc:Choice>
-    <mc:Fallback xmlns="" xmlns:mv="urn:schemas-microsoft-com:mac:vml" xmlns:c="http://schemas.openxmlformats.org/drawingml/2006/chart" xmlns:dgm="http://schemas.openxmlformats.org/drawingml/2006/diagram" xmlns:o="urn:schemas-microsoft-com:office:office" xmlns:v="urn:schemas-microsoft-com:vml" xmlns:pvml="urn:schemas-microsoft-com:office:powerpoint" xmlns:com="http://schemas.openxmlformats.org/drawingml/2006/compatibility" xmlns:p15="http://schemas.microsoft.com/office/powerpoint/2012/main" xmlns:ahyp="http://schemas.microsoft.com/office/drawing/2018/hyperlinkcolor">
+    <mc:Fallback xmlns:ahyp="http://schemas.microsoft.com/office/drawing/2018/hyperlinkcolor" xmlns:p15="http://schemas.microsoft.com/office/powerpoint/2012/main" xmlns:com="http://schemas.openxmlformats.org/drawingml/2006/compatibility" xmlns:pvml="urn:schemas-microsoft-com:office:powerpoint" xmlns:v="urn:schemas-microsoft-com:vml" xmlns:o="urn:schemas-microsoft-com:office:office" xmlns:dgm="http://schemas.openxmlformats.org/drawingml/2006/diagram" xmlns:c="http://schemas.openxmlformats.org/drawingml/2006/chart" xmlns:mv="urn:schemas-microsoft-com:mac:vml" xmlns="">
       <p:transition spd="slow">
         <p:fade/>
       </p:transition>
@@ -24198,8 +25445,8 @@
         </p:nvSpPr>
         <p:spPr>
           <a:xfrm>
-            <a:off x="1396781" y="226774"/>
-            <a:ext cx="6924596" cy="591300"/>
+            <a:off x="1396780" y="226774"/>
+            <a:ext cx="7435519" cy="591300"/>
           </a:xfrm>
           <a:prstGeom prst="rect">
             <a:avLst/>
@@ -24242,7 +25489,7 @@
                 <a:cs typeface="Century Gothic"/>
                 <a:sym typeface="Century Gothic"/>
               </a:rPr>
-              <a:t>Bounded</a:t>
+              <a:t>UpperBounded</a:t>
             </a:r>
             <a:r>
               <a:rPr lang="pt-BR" sz="4000" b="1" dirty="0">
@@ -24664,14 +25911,24 @@
               <a:buSzPct val="97000"/>
             </a:pPr>
             <a:r>
-              <a:rPr lang="pt-BR" sz="2400" dirty="0">
+              <a:rPr lang="pt-BR" sz="2400" dirty="0" err="1">
                 <a:solidFill>
                   <a:srgbClr val="002060"/>
                 </a:solidFill>
                 <a:latin typeface="Calibri" panose="020F0502020204030204" pitchFamily="34" charset="0"/>
                 <a:cs typeface="Calibri" panose="020F0502020204030204" pitchFamily="34" charset="0"/>
               </a:rPr>
-              <a:t>Lista&lt;Aluno&gt; </a:t>
+              <a:t>List</a:t>
+            </a:r>
+            <a:r>
+              <a:rPr lang="pt-BR" sz="2400" dirty="0">
+                <a:solidFill>
+                  <a:srgbClr val="002060"/>
+                </a:solidFill>
+                <a:latin typeface="Calibri" panose="020F0502020204030204" pitchFamily="34" charset="0"/>
+                <a:cs typeface="Calibri" panose="020F0502020204030204" pitchFamily="34" charset="0"/>
+              </a:rPr>
+              <a:t>&lt;Aluno&gt; </a:t>
             </a:r>
             <a:r>
               <a:rPr lang="pt-BR" sz="2400" dirty="0" err="1">
@@ -24691,7 +25948,27 @@
                 <a:latin typeface="Calibri" panose="020F0502020204030204" pitchFamily="34" charset="0"/>
                 <a:cs typeface="Calibri" panose="020F0502020204030204" pitchFamily="34" charset="0"/>
               </a:rPr>
-              <a:t> = new Lista&lt;Aluno&gt;();</a:t>
+              <a:t> = new </a:t>
+            </a:r>
+            <a:r>
+              <a:rPr lang="pt-BR" sz="2400" dirty="0" err="1">
+                <a:solidFill>
+                  <a:srgbClr val="002060"/>
+                </a:solidFill>
+                <a:latin typeface="Calibri" panose="020F0502020204030204" pitchFamily="34" charset="0"/>
+                <a:cs typeface="Calibri" panose="020F0502020204030204" pitchFamily="34" charset="0"/>
+              </a:rPr>
+              <a:t>List</a:t>
+            </a:r>
+            <a:r>
+              <a:rPr lang="pt-BR" sz="2400" dirty="0">
+                <a:solidFill>
+                  <a:srgbClr val="002060"/>
+                </a:solidFill>
+                <a:latin typeface="Calibri" panose="020F0502020204030204" pitchFamily="34" charset="0"/>
+                <a:cs typeface="Calibri" panose="020F0502020204030204" pitchFamily="34" charset="0"/>
+              </a:rPr>
+              <a:t>&lt;Aluno&gt;();</a:t>
             </a:r>
           </a:p>
           <a:p>
@@ -24754,13 +26031,13 @@
   <p:clrMapOvr>
     <a:masterClrMapping/>
   </p:clrMapOvr>
-  <mc:AlternateContent xmlns:mc="http://schemas.openxmlformats.org/markup-compatibility/2006">
-    <mc:Choice xmlns:p14="http://schemas.microsoft.com/office/powerpoint/2010/main" Requires="p14">
+  <mc:AlternateContent xmlns:mc="http://schemas.openxmlformats.org/markup-compatibility/2006" xmlns:p14="http://schemas.microsoft.com/office/powerpoint/2010/main">
+    <mc:Choice Requires="p14">
       <p:transition spd="med" p14:dur="700">
         <p:fade/>
       </p:transition>
     </mc:Choice>
-    <mc:Fallback>
+    <mc:Fallback xmlns="">
       <p:transition spd="med">
         <p:fade/>
       </p:transition>
@@ -24770,6 +26047,616 @@
 </file>
 
 <file path=ppt/slides/slide7.xml><?xml version="1.0" encoding="utf-8"?>
+<p:sld xmlns:a="http://schemas.openxmlformats.org/drawingml/2006/main" xmlns:r="http://schemas.openxmlformats.org/officeDocument/2006/relationships" xmlns:p="http://schemas.openxmlformats.org/presentationml/2006/main">
+  <p:cSld>
+    <p:spTree>
+      <p:nvGrpSpPr>
+        <p:cNvPr id="1" name="Shape 135"/>
+        <p:cNvGrpSpPr/>
+        <p:nvPr/>
+      </p:nvGrpSpPr>
+      <p:grpSpPr>
+        <a:xfrm>
+          <a:off x="0" y="0"/>
+          <a:ext cx="0" cy="0"/>
+          <a:chOff x="0" y="0"/>
+          <a:chExt cx="0" cy="0"/>
+        </a:xfrm>
+      </p:grpSpPr>
+      <p:sp>
+        <p:nvSpPr>
+          <p:cNvPr id="136" name="Google Shape;136;p16"/>
+          <p:cNvSpPr txBox="1">
+            <a:spLocks noGrp="1"/>
+          </p:cNvSpPr>
+          <p:nvPr>
+            <p:ph type="subTitle" idx="1"/>
+          </p:nvPr>
+        </p:nvSpPr>
+        <p:spPr>
+          <a:xfrm>
+            <a:off x="1396781" y="226774"/>
+            <a:ext cx="7545200" cy="591300"/>
+          </a:xfrm>
+          <a:prstGeom prst="rect">
+            <a:avLst/>
+          </a:prstGeom>
+          <a:noFill/>
+          <a:ln>
+            <a:noFill/>
+          </a:ln>
+        </p:spPr>
+        <p:txBody>
+          <a:bodyPr spcFirstLastPara="1" wrap="square" lIns="91425" tIns="91425" rIns="91425" bIns="91425" anchor="ctr" anchorCtr="0">
+            <a:noAutofit/>
+          </a:bodyPr>
+          <a:lstStyle/>
+          <a:p>
+            <a:pPr marL="0" lvl="0" indent="0" algn="ctr" rtl="0">
+              <a:lnSpc>
+                <a:spcPct val="100000"/>
+              </a:lnSpc>
+              <a:spcBef>
+                <a:spcPts val="0"/>
+              </a:spcBef>
+              <a:spcAft>
+                <a:spcPts val="0"/>
+              </a:spcAft>
+              <a:buClr>
+                <a:schemeClr val="dk1"/>
+              </a:buClr>
+              <a:buSzPts val="1100"/>
+              <a:buFont typeface="Arial"/>
+              <a:buNone/>
+            </a:pPr>
+            <a:r>
+              <a:rPr lang="pt-BR" sz="4000" b="1" dirty="0" err="1">
+                <a:solidFill>
+                  <a:srgbClr val="073763"/>
+                </a:solidFill>
+                <a:latin typeface="Century Gothic"/>
+                <a:ea typeface="Century Gothic"/>
+                <a:cs typeface="Century Gothic"/>
+                <a:sym typeface="Century Gothic"/>
+              </a:rPr>
+              <a:t>LowerBounded</a:t>
+            </a:r>
+            <a:r>
+              <a:rPr lang="pt-BR" sz="4000" b="1" dirty="0">
+                <a:solidFill>
+                  <a:srgbClr val="073763"/>
+                </a:solidFill>
+                <a:latin typeface="Century Gothic"/>
+                <a:ea typeface="Century Gothic"/>
+                <a:cs typeface="Century Gothic"/>
+                <a:sym typeface="Century Gothic"/>
+              </a:rPr>
+              <a:t> </a:t>
+            </a:r>
+            <a:r>
+              <a:rPr lang="pt-BR" sz="4000" b="1" dirty="0" err="1">
+                <a:solidFill>
+                  <a:srgbClr val="073763"/>
+                </a:solidFill>
+                <a:latin typeface="Century Gothic"/>
+                <a:ea typeface="Century Gothic"/>
+                <a:cs typeface="Century Gothic"/>
+                <a:sym typeface="Century Gothic"/>
+              </a:rPr>
+              <a:t>Wildcard</a:t>
+            </a:r>
+            <a:endParaRPr lang="pt-BR" sz="4000" b="1" dirty="0">
+              <a:solidFill>
+                <a:srgbClr val="073763"/>
+              </a:solidFill>
+              <a:latin typeface="Century Gothic"/>
+              <a:ea typeface="Century Gothic"/>
+              <a:cs typeface="Century Gothic"/>
+              <a:sym typeface="Century Gothic"/>
+            </a:endParaRPr>
+          </a:p>
+        </p:txBody>
+      </p:sp>
+      <p:pic>
+        <p:nvPicPr>
+          <p:cNvPr id="137" name="Google Shape;137;p16"/>
+          <p:cNvPicPr preferRelativeResize="0"/>
+          <p:nvPr/>
+        </p:nvPicPr>
+        <p:blipFill rotWithShape="1">
+          <a:blip r:embed="rId3">
+            <a:alphaModFix/>
+          </a:blip>
+          <a:srcRect/>
+          <a:stretch/>
+        </p:blipFill>
+        <p:spPr>
+          <a:xfrm>
+            <a:off x="311700" y="243014"/>
+            <a:ext cx="1698849" cy="591351"/>
+          </a:xfrm>
+          <a:prstGeom prst="rect">
+            <a:avLst/>
+          </a:prstGeom>
+          <a:noFill/>
+          <a:ln>
+            <a:noFill/>
+          </a:ln>
+        </p:spPr>
+      </p:pic>
+      <p:sp>
+        <p:nvSpPr>
+          <p:cNvPr id="139" name="Google Shape;139;p16"/>
+          <p:cNvSpPr/>
+          <p:nvPr/>
+        </p:nvSpPr>
+        <p:spPr>
+          <a:xfrm>
+            <a:off x="0" y="5077717"/>
+            <a:ext cx="9144000" cy="57300"/>
+          </a:xfrm>
+          <a:prstGeom prst="rect">
+            <a:avLst/>
+          </a:prstGeom>
+          <a:solidFill>
+            <a:srgbClr val="F78321"/>
+          </a:solidFill>
+          <a:ln w="9525" cap="flat" cmpd="sng">
+            <a:solidFill>
+              <a:srgbClr val="F78321"/>
+            </a:solidFill>
+            <a:prstDash val="solid"/>
+            <a:round/>
+            <a:headEnd type="none" w="sm" len="sm"/>
+            <a:tailEnd type="none" w="sm" len="sm"/>
+          </a:ln>
+        </p:spPr>
+        <p:txBody>
+          <a:bodyPr spcFirstLastPara="1" wrap="square" lIns="91425" tIns="91425" rIns="91425" bIns="91425" anchor="ctr" anchorCtr="0">
+            <a:noAutofit/>
+          </a:bodyPr>
+          <a:lstStyle/>
+          <a:p>
+            <a:pPr marL="0" marR="0" lvl="0" indent="0" algn="l" rtl="0">
+              <a:lnSpc>
+                <a:spcPct val="100000"/>
+              </a:lnSpc>
+              <a:spcBef>
+                <a:spcPts val="0"/>
+              </a:spcBef>
+              <a:spcAft>
+                <a:spcPts val="0"/>
+              </a:spcAft>
+              <a:buClr>
+                <a:srgbClr val="000000"/>
+              </a:buClr>
+              <a:buSzPts val="1400"/>
+              <a:buFont typeface="Arial"/>
+              <a:buNone/>
+            </a:pPr>
+            <a:endParaRPr sz="1400" b="0" i="0" u="none" strike="noStrike" cap="none">
+              <a:solidFill>
+                <a:srgbClr val="000000"/>
+              </a:solidFill>
+              <a:latin typeface="Arial"/>
+              <a:ea typeface="Arial"/>
+              <a:cs typeface="Arial"/>
+              <a:sym typeface="Arial"/>
+            </a:endParaRPr>
+          </a:p>
+        </p:txBody>
+      </p:sp>
+      <p:sp>
+        <p:nvSpPr>
+          <p:cNvPr id="8" name="CaixaDeTexto 7">
+            <a:extLst>
+              <a:ext uri="{FF2B5EF4-FFF2-40B4-BE49-F238E27FC236}">
+                <a16:creationId xmlns:a16="http://schemas.microsoft.com/office/drawing/2014/main" id="{A9CFDAC9-92D1-46DF-B174-06AC75EE93D3}"/>
+              </a:ext>
+            </a:extLst>
+          </p:cNvPr>
+          <p:cNvSpPr txBox="1"/>
+          <p:nvPr/>
+        </p:nvSpPr>
+        <p:spPr>
+          <a:xfrm>
+            <a:off x="237269" y="1371151"/>
+            <a:ext cx="7886002" cy="2677656"/>
+          </a:xfrm>
+          <a:prstGeom prst="rect">
+            <a:avLst/>
+          </a:prstGeom>
+          <a:noFill/>
+        </p:spPr>
+        <p:txBody>
+          <a:bodyPr wrap="square" rtlCol="0">
+            <a:spAutoFit/>
+          </a:bodyPr>
+          <a:lstStyle/>
+          <a:p>
+            <a:pPr>
+              <a:buClr>
+                <a:srgbClr val="002060"/>
+              </a:buClr>
+              <a:buSzPct val="97000"/>
+            </a:pPr>
+            <a:r>
+              <a:rPr lang="pt-BR" sz="2400" dirty="0" err="1">
+                <a:solidFill>
+                  <a:srgbClr val="002060"/>
+                </a:solidFill>
+                <a:latin typeface="Calibri" panose="020F0502020204030204" pitchFamily="34" charset="0"/>
+                <a:cs typeface="Calibri" panose="020F0502020204030204" pitchFamily="34" charset="0"/>
+              </a:rPr>
+              <a:t>public</a:t>
+            </a:r>
+            <a:r>
+              <a:rPr lang="pt-BR" sz="2400" dirty="0">
+                <a:solidFill>
+                  <a:srgbClr val="002060"/>
+                </a:solidFill>
+                <a:latin typeface="Calibri" panose="020F0502020204030204" pitchFamily="34" charset="0"/>
+                <a:cs typeface="Calibri" panose="020F0502020204030204" pitchFamily="34" charset="0"/>
+              </a:rPr>
+              <a:t> </a:t>
+            </a:r>
+            <a:r>
+              <a:rPr lang="pt-BR" sz="2400" dirty="0" err="1">
+                <a:solidFill>
+                  <a:srgbClr val="002060"/>
+                </a:solidFill>
+                <a:latin typeface="Calibri" panose="020F0502020204030204" pitchFamily="34" charset="0"/>
+                <a:cs typeface="Calibri" panose="020F0502020204030204" pitchFamily="34" charset="0"/>
+              </a:rPr>
+              <a:t>void</a:t>
+            </a:r>
+            <a:r>
+              <a:rPr lang="pt-BR" sz="2400" dirty="0">
+                <a:solidFill>
+                  <a:srgbClr val="002060"/>
+                </a:solidFill>
+                <a:latin typeface="Calibri" panose="020F0502020204030204" pitchFamily="34" charset="0"/>
+                <a:cs typeface="Calibri" panose="020F0502020204030204" pitchFamily="34" charset="0"/>
+              </a:rPr>
+              <a:t> </a:t>
+            </a:r>
+            <a:r>
+              <a:rPr lang="pt-BR" sz="2400" dirty="0" err="1">
+                <a:solidFill>
+                  <a:srgbClr val="002060"/>
+                </a:solidFill>
+                <a:latin typeface="Calibri" panose="020F0502020204030204" pitchFamily="34" charset="0"/>
+                <a:cs typeface="Calibri" panose="020F0502020204030204" pitchFamily="34" charset="0"/>
+              </a:rPr>
+              <a:t>imprimeLista</a:t>
+            </a:r>
+            <a:r>
+              <a:rPr lang="pt-BR" sz="2400" dirty="0">
+                <a:solidFill>
+                  <a:srgbClr val="002060"/>
+                </a:solidFill>
+                <a:latin typeface="Calibri" panose="020F0502020204030204" pitchFamily="34" charset="0"/>
+                <a:cs typeface="Calibri" panose="020F0502020204030204" pitchFamily="34" charset="0"/>
+              </a:rPr>
+              <a:t>(</a:t>
+            </a:r>
+            <a:r>
+              <a:rPr lang="pt-BR" sz="2400" dirty="0" err="1">
+                <a:solidFill>
+                  <a:srgbClr val="FF0000"/>
+                </a:solidFill>
+                <a:latin typeface="Calibri" panose="020F0502020204030204" pitchFamily="34" charset="0"/>
+                <a:cs typeface="Calibri" panose="020F0502020204030204" pitchFamily="34" charset="0"/>
+              </a:rPr>
+              <a:t>List</a:t>
+            </a:r>
+            <a:r>
+              <a:rPr lang="pt-BR" sz="2400" dirty="0">
+                <a:solidFill>
+                  <a:srgbClr val="FF0000"/>
+                </a:solidFill>
+                <a:latin typeface="Calibri" panose="020F0502020204030204" pitchFamily="34" charset="0"/>
+                <a:cs typeface="Calibri" panose="020F0502020204030204" pitchFamily="34" charset="0"/>
+              </a:rPr>
+              <a:t>&lt;? super Pessoa</a:t>
+            </a:r>
+            <a:r>
+              <a:rPr lang="pt-BR" sz="2400" dirty="0">
+                <a:solidFill>
+                  <a:srgbClr val="002060"/>
+                </a:solidFill>
+                <a:latin typeface="Calibri" panose="020F0502020204030204" pitchFamily="34" charset="0"/>
+                <a:cs typeface="Calibri" panose="020F0502020204030204" pitchFamily="34" charset="0"/>
+              </a:rPr>
+              <a:t>&gt; </a:t>
+            </a:r>
+            <a:r>
+              <a:rPr lang="pt-BR" sz="2400" dirty="0" err="1">
+                <a:solidFill>
+                  <a:srgbClr val="002060"/>
+                </a:solidFill>
+                <a:latin typeface="Calibri" panose="020F0502020204030204" pitchFamily="34" charset="0"/>
+                <a:cs typeface="Calibri" panose="020F0502020204030204" pitchFamily="34" charset="0"/>
+              </a:rPr>
+              <a:t>listaPessoas</a:t>
+            </a:r>
+            <a:r>
+              <a:rPr lang="pt-BR" sz="2400" dirty="0">
+                <a:solidFill>
+                  <a:srgbClr val="002060"/>
+                </a:solidFill>
+                <a:latin typeface="Calibri" panose="020F0502020204030204" pitchFamily="34" charset="0"/>
+                <a:cs typeface="Calibri" panose="020F0502020204030204" pitchFamily="34" charset="0"/>
+              </a:rPr>
+              <a:t>){</a:t>
+            </a:r>
+          </a:p>
+          <a:p>
+            <a:pPr>
+              <a:buClr>
+                <a:srgbClr val="002060"/>
+              </a:buClr>
+              <a:buSzPct val="97000"/>
+            </a:pPr>
+            <a:r>
+              <a:rPr lang="pt-BR" sz="2400" dirty="0">
+                <a:solidFill>
+                  <a:srgbClr val="002060"/>
+                </a:solidFill>
+                <a:latin typeface="Calibri" panose="020F0502020204030204" pitchFamily="34" charset="0"/>
+                <a:cs typeface="Calibri" panose="020F0502020204030204" pitchFamily="34" charset="0"/>
+              </a:rPr>
+              <a:t>	for(</a:t>
+            </a:r>
+            <a:r>
+              <a:rPr lang="pt-BR" sz="2400" dirty="0">
+                <a:solidFill>
+                  <a:srgbClr val="FF0000"/>
+                </a:solidFill>
+                <a:latin typeface="Calibri" panose="020F0502020204030204" pitchFamily="34" charset="0"/>
+                <a:cs typeface="Calibri" panose="020F0502020204030204" pitchFamily="34" charset="0"/>
+              </a:rPr>
+              <a:t>Pessoa p : </a:t>
+            </a:r>
+            <a:r>
+              <a:rPr lang="pt-BR" sz="2400" dirty="0" err="1">
+                <a:solidFill>
+                  <a:srgbClr val="FF0000"/>
+                </a:solidFill>
+                <a:latin typeface="Calibri" panose="020F0502020204030204" pitchFamily="34" charset="0"/>
+                <a:cs typeface="Calibri" panose="020F0502020204030204" pitchFamily="34" charset="0"/>
+              </a:rPr>
+              <a:t>listaPessoas</a:t>
+            </a:r>
+            <a:r>
+              <a:rPr lang="pt-BR" sz="2400" dirty="0">
+                <a:solidFill>
+                  <a:srgbClr val="002060"/>
+                </a:solidFill>
+                <a:latin typeface="Calibri" panose="020F0502020204030204" pitchFamily="34" charset="0"/>
+                <a:cs typeface="Calibri" panose="020F0502020204030204" pitchFamily="34" charset="0"/>
+              </a:rPr>
+              <a:t>){</a:t>
+            </a:r>
+          </a:p>
+          <a:p>
+            <a:pPr>
+              <a:buClr>
+                <a:srgbClr val="002060"/>
+              </a:buClr>
+              <a:buSzPct val="97000"/>
+            </a:pPr>
+            <a:r>
+              <a:rPr lang="pt-BR" sz="2400" dirty="0">
+                <a:solidFill>
+                  <a:srgbClr val="002060"/>
+                </a:solidFill>
+                <a:latin typeface="Calibri" panose="020F0502020204030204" pitchFamily="34" charset="0"/>
+                <a:cs typeface="Calibri" panose="020F0502020204030204" pitchFamily="34" charset="0"/>
+              </a:rPr>
+              <a:t>		</a:t>
+            </a:r>
+            <a:r>
+              <a:rPr lang="pt-BR" sz="2400" dirty="0" err="1">
+                <a:solidFill>
+                  <a:srgbClr val="002060"/>
+                </a:solidFill>
+                <a:latin typeface="Calibri" panose="020F0502020204030204" pitchFamily="34" charset="0"/>
+                <a:cs typeface="Calibri" panose="020F0502020204030204" pitchFamily="34" charset="0"/>
+              </a:rPr>
+              <a:t>System.out.println</a:t>
+            </a:r>
+            <a:r>
+              <a:rPr lang="pt-BR" sz="2400" dirty="0">
+                <a:solidFill>
+                  <a:srgbClr val="002060"/>
+                </a:solidFill>
+                <a:latin typeface="Calibri" panose="020F0502020204030204" pitchFamily="34" charset="0"/>
+                <a:cs typeface="Calibri" panose="020F0502020204030204" pitchFamily="34" charset="0"/>
+              </a:rPr>
+              <a:t>(p);</a:t>
+            </a:r>
+          </a:p>
+          <a:p>
+            <a:pPr>
+              <a:buClr>
+                <a:srgbClr val="002060"/>
+              </a:buClr>
+              <a:buSzPct val="97000"/>
+            </a:pPr>
+            <a:r>
+              <a:rPr lang="pt-BR" sz="2400" dirty="0">
+                <a:solidFill>
+                  <a:srgbClr val="002060"/>
+                </a:solidFill>
+                <a:latin typeface="Calibri" panose="020F0502020204030204" pitchFamily="34" charset="0"/>
+                <a:cs typeface="Calibri" panose="020F0502020204030204" pitchFamily="34" charset="0"/>
+              </a:rPr>
+              <a:t>	}</a:t>
+            </a:r>
+          </a:p>
+          <a:p>
+            <a:pPr>
+              <a:buClr>
+                <a:srgbClr val="002060"/>
+              </a:buClr>
+              <a:buSzPct val="97000"/>
+            </a:pPr>
+            <a:r>
+              <a:rPr lang="pt-BR" sz="2400" dirty="0">
+                <a:solidFill>
+                  <a:srgbClr val="002060"/>
+                </a:solidFill>
+                <a:latin typeface="Calibri" panose="020F0502020204030204" pitchFamily="34" charset="0"/>
+                <a:cs typeface="Calibri" panose="020F0502020204030204" pitchFamily="34" charset="0"/>
+              </a:rPr>
+              <a:t>}</a:t>
+            </a:r>
+          </a:p>
+          <a:p>
+            <a:pPr>
+              <a:buClr>
+                <a:srgbClr val="002060"/>
+              </a:buClr>
+              <a:buSzPct val="97000"/>
+            </a:pPr>
+            <a:r>
+              <a:rPr lang="pt-BR" sz="2400" dirty="0" err="1">
+                <a:solidFill>
+                  <a:srgbClr val="002060"/>
+                </a:solidFill>
+                <a:latin typeface="Calibri" panose="020F0502020204030204" pitchFamily="34" charset="0"/>
+                <a:cs typeface="Calibri" panose="020F0502020204030204" pitchFamily="34" charset="0"/>
+              </a:rPr>
+              <a:t>List</a:t>
+            </a:r>
+            <a:r>
+              <a:rPr lang="pt-BR" sz="2400" dirty="0">
+                <a:solidFill>
+                  <a:srgbClr val="002060"/>
+                </a:solidFill>
+                <a:latin typeface="Calibri" panose="020F0502020204030204" pitchFamily="34" charset="0"/>
+                <a:cs typeface="Calibri" panose="020F0502020204030204" pitchFamily="34" charset="0"/>
+              </a:rPr>
+              <a:t>&lt;Aluno&gt; </a:t>
+            </a:r>
+            <a:r>
+              <a:rPr lang="pt-BR" sz="2400" dirty="0" err="1">
+                <a:solidFill>
+                  <a:srgbClr val="002060"/>
+                </a:solidFill>
+                <a:latin typeface="Calibri" panose="020F0502020204030204" pitchFamily="34" charset="0"/>
+                <a:cs typeface="Calibri" panose="020F0502020204030204" pitchFamily="34" charset="0"/>
+              </a:rPr>
+              <a:t>minhaLista</a:t>
+            </a:r>
+            <a:r>
+              <a:rPr lang="pt-BR" sz="2400" dirty="0">
+                <a:solidFill>
+                  <a:srgbClr val="002060"/>
+                </a:solidFill>
+                <a:latin typeface="Calibri" panose="020F0502020204030204" pitchFamily="34" charset="0"/>
+                <a:cs typeface="Calibri" panose="020F0502020204030204" pitchFamily="34" charset="0"/>
+              </a:rPr>
+              <a:t> = new </a:t>
+            </a:r>
+            <a:r>
+              <a:rPr lang="pt-BR" sz="2400" dirty="0" err="1">
+                <a:solidFill>
+                  <a:srgbClr val="002060"/>
+                </a:solidFill>
+                <a:latin typeface="Calibri" panose="020F0502020204030204" pitchFamily="34" charset="0"/>
+                <a:cs typeface="Calibri" panose="020F0502020204030204" pitchFamily="34" charset="0"/>
+              </a:rPr>
+              <a:t>List</a:t>
+            </a:r>
+            <a:r>
+              <a:rPr lang="pt-BR" sz="2400" dirty="0">
+                <a:solidFill>
+                  <a:srgbClr val="002060"/>
+                </a:solidFill>
+                <a:latin typeface="Calibri" panose="020F0502020204030204" pitchFamily="34" charset="0"/>
+                <a:cs typeface="Calibri" panose="020F0502020204030204" pitchFamily="34" charset="0"/>
+              </a:rPr>
+              <a:t>&lt;Aluno&gt;();</a:t>
+            </a:r>
+          </a:p>
+          <a:p>
+            <a:pPr>
+              <a:buClr>
+                <a:srgbClr val="002060"/>
+              </a:buClr>
+              <a:buSzPct val="97000"/>
+            </a:pPr>
+            <a:r>
+              <a:rPr lang="pt-BR" sz="2400" dirty="0" err="1">
+                <a:solidFill>
+                  <a:srgbClr val="002060"/>
+                </a:solidFill>
+                <a:latin typeface="Calibri" panose="020F0502020204030204" pitchFamily="34" charset="0"/>
+                <a:cs typeface="Calibri" panose="020F0502020204030204" pitchFamily="34" charset="0"/>
+              </a:rPr>
+              <a:t>imprimeLista</a:t>
+            </a:r>
+            <a:r>
+              <a:rPr lang="pt-BR" sz="2400" dirty="0">
+                <a:solidFill>
+                  <a:srgbClr val="002060"/>
+                </a:solidFill>
+                <a:latin typeface="Calibri" panose="020F0502020204030204" pitchFamily="34" charset="0"/>
+                <a:cs typeface="Calibri" panose="020F0502020204030204" pitchFamily="34" charset="0"/>
+              </a:rPr>
+              <a:t>(</a:t>
+            </a:r>
+            <a:r>
+              <a:rPr lang="pt-BR" sz="2400" dirty="0" err="1">
+                <a:solidFill>
+                  <a:srgbClr val="002060"/>
+                </a:solidFill>
+                <a:latin typeface="Calibri" panose="020F0502020204030204" pitchFamily="34" charset="0"/>
+                <a:cs typeface="Calibri" panose="020F0502020204030204" pitchFamily="34" charset="0"/>
+              </a:rPr>
+              <a:t>minhaLista</a:t>
+            </a:r>
+            <a:r>
+              <a:rPr lang="pt-BR" sz="2400" dirty="0">
+                <a:solidFill>
+                  <a:srgbClr val="002060"/>
+                </a:solidFill>
+                <a:latin typeface="Calibri" panose="020F0502020204030204" pitchFamily="34" charset="0"/>
+                <a:cs typeface="Calibri" panose="020F0502020204030204" pitchFamily="34" charset="0"/>
+              </a:rPr>
+              <a:t>);</a:t>
+            </a:r>
+          </a:p>
+        </p:txBody>
+      </p:sp>
+    </p:spTree>
+    <p:extLst>
+      <p:ext uri="{BB962C8B-B14F-4D97-AF65-F5344CB8AC3E}">
+        <p14:creationId xmlns:p14="http://schemas.microsoft.com/office/powerpoint/2010/main" val="2325568274"/>
+      </p:ext>
+    </p:extLst>
+  </p:cSld>
+  <p:clrMapOvr>
+    <a:masterClrMapping/>
+  </p:clrMapOvr>
+  <mc:AlternateContent xmlns:mc="http://schemas.openxmlformats.org/markup-compatibility/2006" xmlns:p14="http://schemas.microsoft.com/office/powerpoint/2010/main">
+    <mc:Choice Requires="p14">
+      <p:transition spd="med" p14:dur="700">
+        <p:fade/>
+      </p:transition>
+    </mc:Choice>
+    <mc:Fallback xmlns="">
+      <p:transition spd="med">
+        <p:fade/>
+      </p:transition>
+    </mc:Fallback>
+  </mc:AlternateContent>
+</p:sld>
+</file>
+
+<file path=ppt/slides/slide8.xml><?xml version="1.0" encoding="utf-8"?>
 <p:sld xmlns:a="http://schemas.openxmlformats.org/drawingml/2006/main" xmlns:r="http://schemas.openxmlformats.org/officeDocument/2006/relationships" xmlns:p="http://schemas.openxmlformats.org/presentationml/2006/main">
   <p:cSld>
     <p:spTree>
@@ -24951,7 +26838,7 @@
         <p:spPr>
           <a:xfrm>
             <a:off x="237269" y="1371151"/>
-            <a:ext cx="7886002" cy="1569660"/>
+            <a:ext cx="7886002" cy="1938992"/>
           </a:xfrm>
           <a:prstGeom prst="rect">
             <a:avLst/>
@@ -25180,6 +27067,36 @@
               <a:cs typeface="Calibri" panose="020F0502020204030204" pitchFamily="34" charset="0"/>
             </a:endParaRPr>
           </a:p>
+          <a:p>
+            <a:pPr marL="342900" indent="-342900">
+              <a:buClr>
+                <a:srgbClr val="002060"/>
+              </a:buClr>
+              <a:buSzPct val="97000"/>
+              <a:buFont typeface="Arial" panose="020B0604020202020204" pitchFamily="34" charset="0"/>
+              <a:buChar char="•"/>
+            </a:pPr>
+            <a:r>
+              <a:rPr lang="pt-BR" sz="2400" b="1" dirty="0">
+                <a:solidFill>
+                  <a:srgbClr val="002060"/>
+                </a:solidFill>
+                <a:latin typeface="Calibri" panose="020F0502020204030204" pitchFamily="34" charset="0"/>
+                <a:cs typeface="Calibri" panose="020F0502020204030204" pitchFamily="34" charset="0"/>
+              </a:rPr>
+              <a:t>?</a:t>
+            </a:r>
+            <a:r>
+              <a:rPr lang="pt-BR" sz="2400" dirty="0">
+                <a:solidFill>
+                  <a:srgbClr val="002060"/>
+                </a:solidFill>
+                <a:latin typeface="Calibri" panose="020F0502020204030204" pitchFamily="34" charset="0"/>
+                <a:cs typeface="Calibri" panose="020F0502020204030204" pitchFamily="34" charset="0"/>
+              </a:rPr>
+              <a:t> quando genérico</a:t>
+            </a:r>
+          </a:p>
         </p:txBody>
       </p:sp>
     </p:spTree>
@@ -25192,13 +27109,13 @@
   <p:clrMapOvr>
     <a:masterClrMapping/>
   </p:clrMapOvr>
-  <mc:AlternateContent xmlns:mc="http://schemas.openxmlformats.org/markup-compatibility/2006">
-    <mc:Choice xmlns:p14="http://schemas.microsoft.com/office/powerpoint/2010/main" Requires="p14">
+  <mc:AlternateContent xmlns:mc="http://schemas.openxmlformats.org/markup-compatibility/2006" xmlns:p14="http://schemas.microsoft.com/office/powerpoint/2010/main">
+    <mc:Choice Requires="p14">
       <p:transition spd="med" p14:dur="700">
         <p:fade/>
       </p:transition>
     </mc:Choice>
-    <mc:Fallback>
+    <mc:Fallback xmlns="">
       <p:transition spd="med">
         <p:fade/>
       </p:transition>
@@ -25207,7 +27124,7 @@
 </p:sld>
 </file>
 
-<file path=ppt/slides/slide8.xml><?xml version="1.0" encoding="utf-8"?>
+<file path=ppt/slides/slide9.xml><?xml version="1.0" encoding="utf-8"?>
 <p:sld xmlns:a="http://schemas.openxmlformats.org/drawingml/2006/main" xmlns:r="http://schemas.openxmlformats.org/officeDocument/2006/relationships" xmlns:p="http://schemas.openxmlformats.org/presentationml/2006/main">
   <p:cSld>
     <p:spTree>
@@ -25405,8 +27322,8 @@
         </p:blipFill>
         <p:spPr>
           <a:xfrm>
-            <a:off x="4892039" y="834314"/>
-            <a:ext cx="3973400" cy="3973400"/>
+            <a:off x="4365110" y="834314"/>
+            <a:ext cx="2585233" cy="2585233"/>
           </a:xfrm>
           <a:prstGeom prst="rect">
             <a:avLst/>
@@ -25515,1013 +27432,12 @@
         <p:fade/>
       </p:transition>
     </mc:Choice>
-    <mc:Fallback xmlns="" xmlns:mv="urn:schemas-microsoft-com:mac:vml" xmlns:c="http://schemas.openxmlformats.org/drawingml/2006/chart" xmlns:dgm="http://schemas.openxmlformats.org/drawingml/2006/diagram" xmlns:o="urn:schemas-microsoft-com:office:office" xmlns:v="urn:schemas-microsoft-com:vml" xmlns:pvml="urn:schemas-microsoft-com:office:powerpoint" xmlns:com="http://schemas.openxmlformats.org/drawingml/2006/compatibility" xmlns:p15="http://schemas.microsoft.com/office/powerpoint/2012/main" xmlns:ahyp="http://schemas.microsoft.com/office/drawing/2018/hyperlinkcolor">
+    <mc:Fallback xmlns:ahyp="http://schemas.microsoft.com/office/drawing/2018/hyperlinkcolor" xmlns:p15="http://schemas.microsoft.com/office/powerpoint/2012/main" xmlns:com="http://schemas.openxmlformats.org/drawingml/2006/compatibility" xmlns:pvml="urn:schemas-microsoft-com:office:powerpoint" xmlns:v="urn:schemas-microsoft-com:vml" xmlns:o="urn:schemas-microsoft-com:office:office" xmlns:dgm="http://schemas.openxmlformats.org/drawingml/2006/diagram" xmlns:c="http://schemas.openxmlformats.org/drawingml/2006/chart" xmlns:mv="urn:schemas-microsoft-com:mac:vml" xmlns="">
       <p:transition spd="slow">
         <p:fade/>
       </p:transition>
     </mc:Fallback>
   </mc:AlternateContent>
-</p:sld>
-</file>
-
-<file path=ppt/slides/slide9.xml><?xml version="1.0" encoding="utf-8"?>
-<p:sld xmlns:a="http://schemas.openxmlformats.org/drawingml/2006/main" xmlns:r="http://schemas.openxmlformats.org/officeDocument/2006/relationships" xmlns:p="http://schemas.openxmlformats.org/presentationml/2006/main">
-  <p:cSld>
-    <p:spTree>
-      <p:nvGrpSpPr>
-        <p:cNvPr id="1" name="Shape 164"/>
-        <p:cNvGrpSpPr/>
-        <p:nvPr/>
-      </p:nvGrpSpPr>
-      <p:grpSpPr>
-        <a:xfrm>
-          <a:off x="0" y="0"/>
-          <a:ext cx="0" cy="0"/>
-          <a:chOff x="0" y="0"/>
-          <a:chExt cx="0" cy="0"/>
-        </a:xfrm>
-      </p:grpSpPr>
-      <p:sp>
-        <p:nvSpPr>
-          <p:cNvPr id="165" name="Google Shape;165;p14"/>
-          <p:cNvSpPr txBox="1">
-            <a:spLocks noGrp="1"/>
-          </p:cNvSpPr>
-          <p:nvPr>
-            <p:ph type="ctrTitle"/>
-          </p:nvPr>
-        </p:nvSpPr>
-        <p:spPr>
-          <a:xfrm>
-            <a:off x="387900" y="3811550"/>
-            <a:ext cx="8520600" cy="201300"/>
-          </a:xfrm>
-          <a:prstGeom prst="rect">
-            <a:avLst/>
-          </a:prstGeom>
-          <a:noFill/>
-          <a:ln>
-            <a:noFill/>
-          </a:ln>
-        </p:spPr>
-        <p:txBody>
-          <a:bodyPr spcFirstLastPara="1" wrap="square" lIns="91425" tIns="91425" rIns="91425" bIns="91425" anchor="ctr" anchorCtr="0">
-            <a:noAutofit/>
-          </a:bodyPr>
-          <a:lstStyle/>
-          <a:p>
-            <a:pPr marL="0" lvl="0" indent="0" algn="l" rtl="0">
-              <a:lnSpc>
-                <a:spcPct val="100000"/>
-              </a:lnSpc>
-              <a:spcBef>
-                <a:spcPts val="7200"/>
-              </a:spcBef>
-              <a:spcAft>
-                <a:spcPts val="0"/>
-              </a:spcAft>
-              <a:buClr>
-                <a:schemeClr val="dk1"/>
-              </a:buClr>
-              <a:buSzPts val="1100"/>
-              <a:buFont typeface="Arial"/>
-              <a:buNone/>
-            </a:pPr>
-            <a:r>
-              <a:rPr lang="en-US" sz="2000">
-                <a:solidFill>
-                  <a:srgbClr val="404040"/>
-                </a:solidFill>
-                <a:latin typeface="Century Gothic"/>
-                <a:ea typeface="Century Gothic"/>
-                <a:cs typeface="Century Gothic"/>
-                <a:sym typeface="Century Gothic"/>
-              </a:rPr>
-              <a:t>[Nome do palestrante]</a:t>
-            </a:r>
-            <a:br>
-              <a:rPr lang="en-US" sz="2000">
-                <a:solidFill>
-                  <a:srgbClr val="404040"/>
-                </a:solidFill>
-                <a:latin typeface="Century Gothic"/>
-                <a:ea typeface="Century Gothic"/>
-                <a:cs typeface="Century Gothic"/>
-                <a:sym typeface="Century Gothic"/>
-              </a:rPr>
-            </a:br>
-            <a:r>
-              <a:rPr lang="en-US" sz="1500">
-                <a:solidFill>
-                  <a:srgbClr val="404040"/>
-                </a:solidFill>
-                <a:latin typeface="Century Gothic"/>
-                <a:ea typeface="Century Gothic"/>
-                <a:cs typeface="Century Gothic"/>
-                <a:sym typeface="Century Gothic"/>
-              </a:rPr>
-              <a:t>[Posição]</a:t>
-            </a:r>
-            <a:endParaRPr sz="1500">
-              <a:solidFill>
-                <a:srgbClr val="404040"/>
-              </a:solidFill>
-              <a:latin typeface="Century Gothic"/>
-              <a:ea typeface="Century Gothic"/>
-              <a:cs typeface="Century Gothic"/>
-              <a:sym typeface="Century Gothic"/>
-            </a:endParaRPr>
-          </a:p>
-        </p:txBody>
-      </p:sp>
-      <p:sp>
-        <p:nvSpPr>
-          <p:cNvPr id="166" name="Google Shape;166;p14"/>
-          <p:cNvSpPr txBox="1">
-            <a:spLocks noGrp="1"/>
-          </p:cNvSpPr>
-          <p:nvPr>
-            <p:ph type="ctrTitle"/>
-          </p:nvPr>
-        </p:nvSpPr>
-        <p:spPr>
-          <a:xfrm>
-            <a:off x="311700" y="756825"/>
-            <a:ext cx="8520600" cy="506400"/>
-          </a:xfrm>
-          <a:prstGeom prst="rect">
-            <a:avLst/>
-          </a:prstGeom>
-          <a:noFill/>
-          <a:ln>
-            <a:noFill/>
-          </a:ln>
-        </p:spPr>
-        <p:txBody>
-          <a:bodyPr spcFirstLastPara="1" wrap="square" lIns="91425" tIns="91425" rIns="91425" bIns="91425" anchor="ctr" anchorCtr="0">
-            <a:noAutofit/>
-          </a:bodyPr>
-          <a:lstStyle/>
-          <a:p>
-            <a:pPr marL="0" lvl="0" indent="0" algn="l" rtl="0">
-              <a:lnSpc>
-                <a:spcPct val="100000"/>
-              </a:lnSpc>
-              <a:spcBef>
-                <a:spcPts val="7200"/>
-              </a:spcBef>
-              <a:spcAft>
-                <a:spcPts val="0"/>
-              </a:spcAft>
-              <a:buClr>
-                <a:schemeClr val="dk1"/>
-              </a:buClr>
-              <a:buSzPts val="1100"/>
-              <a:buFont typeface="Arial"/>
-              <a:buNone/>
-            </a:pPr>
-            <a:r>
-              <a:rPr lang="en-US" sz="3600">
-                <a:solidFill>
-                  <a:srgbClr val="F78321"/>
-                </a:solidFill>
-                <a:latin typeface="Century Gothic"/>
-                <a:ea typeface="Century Gothic"/>
-                <a:cs typeface="Century Gothic"/>
-                <a:sym typeface="Century Gothic"/>
-              </a:rPr>
-              <a:t>[Nome do curso]</a:t>
-            </a:r>
-            <a:endParaRPr sz="3600">
-              <a:solidFill>
-                <a:srgbClr val="F78321"/>
-              </a:solidFill>
-              <a:latin typeface="Century Gothic"/>
-              <a:ea typeface="Century Gothic"/>
-              <a:cs typeface="Century Gothic"/>
-              <a:sym typeface="Century Gothic"/>
-            </a:endParaRPr>
-          </a:p>
-        </p:txBody>
-      </p:sp>
-      <p:sp>
-        <p:nvSpPr>
-          <p:cNvPr id="167" name="Google Shape;167;p14"/>
-          <p:cNvSpPr txBox="1">
-            <a:spLocks noGrp="1"/>
-          </p:cNvSpPr>
-          <p:nvPr>
-            <p:ph type="subTitle" idx="1"/>
-          </p:nvPr>
-        </p:nvSpPr>
-        <p:spPr>
-          <a:xfrm>
-            <a:off x="311700" y="1828950"/>
-            <a:ext cx="8520600" cy="133800"/>
-          </a:xfrm>
-          <a:prstGeom prst="rect">
-            <a:avLst/>
-          </a:prstGeom>
-          <a:noFill/>
-          <a:ln>
-            <a:noFill/>
-          </a:ln>
-        </p:spPr>
-        <p:txBody>
-          <a:bodyPr spcFirstLastPara="1" wrap="square" lIns="91425" tIns="91425" rIns="91425" bIns="91425" anchor="ctr" anchorCtr="0">
-            <a:noAutofit/>
-          </a:bodyPr>
-          <a:lstStyle/>
-          <a:p>
-            <a:pPr marL="0" lvl="0" indent="0" algn="l" rtl="0">
-              <a:lnSpc>
-                <a:spcPct val="100000"/>
-              </a:lnSpc>
-              <a:spcBef>
-                <a:spcPts val="7200"/>
-              </a:spcBef>
-              <a:spcAft>
-                <a:spcPts val="0"/>
-              </a:spcAft>
-              <a:buClr>
-                <a:schemeClr val="dk1"/>
-              </a:buClr>
-              <a:buSzPts val="1100"/>
-              <a:buFont typeface="Arial"/>
-              <a:buNone/>
-            </a:pPr>
-            <a:r>
-              <a:rPr lang="en-US" sz="6600" b="1">
-                <a:solidFill>
-                  <a:srgbClr val="404040"/>
-                </a:solidFill>
-                <a:latin typeface="Century Gothic"/>
-                <a:ea typeface="Century Gothic"/>
-                <a:cs typeface="Century Gothic"/>
-                <a:sym typeface="Century Gothic"/>
-              </a:rPr>
-              <a:t>[Nome da aula]</a:t>
-            </a:r>
-            <a:endParaRPr sz="6600" b="1">
-              <a:solidFill>
-                <a:srgbClr val="404040"/>
-              </a:solidFill>
-              <a:latin typeface="Century Gothic"/>
-              <a:ea typeface="Century Gothic"/>
-              <a:cs typeface="Century Gothic"/>
-              <a:sym typeface="Century Gothic"/>
-            </a:endParaRPr>
-          </a:p>
-        </p:txBody>
-      </p:sp>
-      <p:sp>
-        <p:nvSpPr>
-          <p:cNvPr id="168" name="Google Shape;168;p14"/>
-          <p:cNvSpPr/>
-          <p:nvPr/>
-        </p:nvSpPr>
-        <p:spPr>
-          <a:xfrm>
-            <a:off x="465750" y="3872065"/>
-            <a:ext cx="447600" cy="57300"/>
-          </a:xfrm>
-          <a:prstGeom prst="rect">
-            <a:avLst/>
-          </a:prstGeom>
-          <a:solidFill>
-            <a:srgbClr val="F78321"/>
-          </a:solidFill>
-          <a:ln w="9525" cap="flat" cmpd="sng">
-            <a:solidFill>
-              <a:srgbClr val="F78321"/>
-            </a:solidFill>
-            <a:prstDash val="solid"/>
-            <a:round/>
-            <a:headEnd type="none" w="sm" len="sm"/>
-            <a:tailEnd type="none" w="sm" len="sm"/>
-          </a:ln>
-        </p:spPr>
-        <p:txBody>
-          <a:bodyPr spcFirstLastPara="1" wrap="square" lIns="91425" tIns="91425" rIns="91425" bIns="91425" anchor="ctr" anchorCtr="0">
-            <a:noAutofit/>
-          </a:bodyPr>
-          <a:lstStyle/>
-          <a:p>
-            <a:pPr marL="0" marR="0" lvl="0" indent="0" algn="l" rtl="0">
-              <a:lnSpc>
-                <a:spcPct val="100000"/>
-              </a:lnSpc>
-              <a:spcBef>
-                <a:spcPts val="0"/>
-              </a:spcBef>
-              <a:spcAft>
-                <a:spcPts val="0"/>
-              </a:spcAft>
-              <a:buClr>
-                <a:srgbClr val="000000"/>
-              </a:buClr>
-              <a:buSzPts val="1400"/>
-              <a:buFont typeface="Arial"/>
-              <a:buNone/>
-            </a:pPr>
-            <a:endParaRPr sz="1400" b="0" i="0" u="none" strike="noStrike" cap="none">
-              <a:solidFill>
-                <a:srgbClr val="000000"/>
-              </a:solidFill>
-              <a:latin typeface="Arial"/>
-              <a:ea typeface="Arial"/>
-              <a:cs typeface="Arial"/>
-              <a:sym typeface="Arial"/>
-            </a:endParaRPr>
-          </a:p>
-        </p:txBody>
-      </p:sp>
-      <p:sp>
-        <p:nvSpPr>
-          <p:cNvPr id="169" name="Google Shape;169;p14"/>
-          <p:cNvSpPr/>
-          <p:nvPr/>
-        </p:nvSpPr>
-        <p:spPr>
-          <a:xfrm>
-            <a:off x="0" y="57301"/>
-            <a:ext cx="9144000" cy="5086050"/>
-          </a:xfrm>
-          <a:prstGeom prst="rect">
-            <a:avLst/>
-          </a:prstGeom>
-          <a:solidFill>
-            <a:srgbClr val="404040"/>
-          </a:solidFill>
-          <a:ln w="9525" cap="flat" cmpd="sng">
-            <a:solidFill>
-              <a:srgbClr val="404040"/>
-            </a:solidFill>
-            <a:prstDash val="solid"/>
-            <a:round/>
-            <a:headEnd type="none" w="sm" len="sm"/>
-            <a:tailEnd type="none" w="sm" len="sm"/>
-          </a:ln>
-        </p:spPr>
-        <p:txBody>
-          <a:bodyPr spcFirstLastPara="1" wrap="square" lIns="91425" tIns="91425" rIns="91425" bIns="91425" anchor="ctr" anchorCtr="0">
-            <a:noAutofit/>
-          </a:bodyPr>
-          <a:lstStyle/>
-          <a:p>
-            <a:pPr marL="0" marR="0" lvl="0" indent="0" algn="l" rtl="0">
-              <a:lnSpc>
-                <a:spcPct val="100000"/>
-              </a:lnSpc>
-              <a:spcBef>
-                <a:spcPts val="0"/>
-              </a:spcBef>
-              <a:spcAft>
-                <a:spcPts val="0"/>
-              </a:spcAft>
-              <a:buClr>
-                <a:srgbClr val="000000"/>
-              </a:buClr>
-              <a:buSzPts val="1400"/>
-              <a:buFont typeface="Arial"/>
-              <a:buNone/>
-            </a:pPr>
-            <a:endParaRPr sz="1400" b="0" i="0" u="none" strike="noStrike" cap="none">
-              <a:solidFill>
-                <a:srgbClr val="000000"/>
-              </a:solidFill>
-              <a:latin typeface="Arial"/>
-              <a:ea typeface="Arial"/>
-              <a:cs typeface="Arial"/>
-              <a:sym typeface="Arial"/>
-            </a:endParaRPr>
-          </a:p>
-        </p:txBody>
-      </p:sp>
-      <p:sp>
-        <p:nvSpPr>
-          <p:cNvPr id="170" name="Google Shape;170;p14"/>
-          <p:cNvSpPr/>
-          <p:nvPr/>
-        </p:nvSpPr>
-        <p:spPr>
-          <a:xfrm>
-            <a:off x="0" y="0"/>
-            <a:ext cx="9144000" cy="57300"/>
-          </a:xfrm>
-          <a:prstGeom prst="rect">
-            <a:avLst/>
-          </a:prstGeom>
-          <a:solidFill>
-            <a:srgbClr val="F78321"/>
-          </a:solidFill>
-          <a:ln w="9525" cap="flat" cmpd="sng">
-            <a:solidFill>
-              <a:srgbClr val="F78321"/>
-            </a:solidFill>
-            <a:prstDash val="solid"/>
-            <a:round/>
-            <a:headEnd type="none" w="sm" len="sm"/>
-            <a:tailEnd type="none" w="sm" len="sm"/>
-          </a:ln>
-        </p:spPr>
-        <p:txBody>
-          <a:bodyPr spcFirstLastPara="1" wrap="square" lIns="91425" tIns="91425" rIns="91425" bIns="91425" anchor="ctr" anchorCtr="0">
-            <a:noAutofit/>
-          </a:bodyPr>
-          <a:lstStyle/>
-          <a:p>
-            <a:pPr marL="0" marR="0" lvl="0" indent="0" algn="l" rtl="0">
-              <a:lnSpc>
-                <a:spcPct val="100000"/>
-              </a:lnSpc>
-              <a:spcBef>
-                <a:spcPts val="0"/>
-              </a:spcBef>
-              <a:spcAft>
-                <a:spcPts val="0"/>
-              </a:spcAft>
-              <a:buClr>
-                <a:srgbClr val="000000"/>
-              </a:buClr>
-              <a:buSzPts val="1400"/>
-              <a:buFont typeface="Arial"/>
-              <a:buNone/>
-            </a:pPr>
-            <a:endParaRPr sz="1400" b="0" i="0" u="none" strike="noStrike" cap="none">
-              <a:solidFill>
-                <a:srgbClr val="000000"/>
-              </a:solidFill>
-              <a:latin typeface="Arial"/>
-              <a:ea typeface="Arial"/>
-              <a:cs typeface="Arial"/>
-              <a:sym typeface="Arial"/>
-            </a:endParaRPr>
-          </a:p>
-        </p:txBody>
-      </p:sp>
-      <p:pic>
-        <p:nvPicPr>
-          <p:cNvPr id="171" name="Google Shape;171;p14"/>
-          <p:cNvPicPr preferRelativeResize="0"/>
-          <p:nvPr/>
-        </p:nvPicPr>
-        <p:blipFill rotWithShape="1">
-          <a:blip r:embed="rId3">
-            <a:alphaModFix/>
-          </a:blip>
-          <a:srcRect/>
-          <a:stretch/>
-        </p:blipFill>
-        <p:spPr>
-          <a:xfrm>
-            <a:off x="311700" y="260014"/>
-            <a:ext cx="1698849" cy="591371"/>
-          </a:xfrm>
-          <a:prstGeom prst="rect">
-            <a:avLst/>
-          </a:prstGeom>
-          <a:noFill/>
-          <a:ln>
-            <a:noFill/>
-          </a:ln>
-        </p:spPr>
-      </p:pic>
-      <p:sp>
-        <p:nvSpPr>
-          <p:cNvPr id="172" name="Google Shape;172;p14"/>
-          <p:cNvSpPr/>
-          <p:nvPr/>
-        </p:nvSpPr>
-        <p:spPr>
-          <a:xfrm>
-            <a:off x="0" y="4839750"/>
-            <a:ext cx="9144000" cy="303600"/>
-          </a:xfrm>
-          <a:prstGeom prst="rect">
-            <a:avLst/>
-          </a:prstGeom>
-          <a:solidFill>
-            <a:schemeClr val="lt1"/>
-          </a:solidFill>
-          <a:ln w="9525" cap="flat" cmpd="sng">
-            <a:solidFill>
-              <a:schemeClr val="lt1"/>
-            </a:solidFill>
-            <a:prstDash val="solid"/>
-            <a:round/>
-            <a:headEnd type="none" w="sm" len="sm"/>
-            <a:tailEnd type="none" w="sm" len="sm"/>
-          </a:ln>
-        </p:spPr>
-        <p:txBody>
-          <a:bodyPr spcFirstLastPara="1" wrap="square" lIns="91425" tIns="91425" rIns="91425" bIns="91425" anchor="ctr" anchorCtr="0">
-            <a:noAutofit/>
-          </a:bodyPr>
-          <a:lstStyle/>
-          <a:p>
-            <a:pPr marL="0" marR="0" lvl="0" indent="0" algn="l" rtl="0">
-              <a:lnSpc>
-                <a:spcPct val="100000"/>
-              </a:lnSpc>
-              <a:spcBef>
-                <a:spcPts val="0"/>
-              </a:spcBef>
-              <a:spcAft>
-                <a:spcPts val="0"/>
-              </a:spcAft>
-              <a:buClr>
-                <a:srgbClr val="000000"/>
-              </a:buClr>
-              <a:buSzPts val="1400"/>
-              <a:buFont typeface="Arial"/>
-              <a:buNone/>
-            </a:pPr>
-            <a:endParaRPr sz="1400" b="0" i="0" u="none" strike="noStrike" cap="none">
-              <a:solidFill>
-                <a:schemeClr val="lt1"/>
-              </a:solidFill>
-              <a:latin typeface="Arial"/>
-              <a:ea typeface="Arial"/>
-              <a:cs typeface="Arial"/>
-              <a:sym typeface="Arial"/>
-            </a:endParaRPr>
-          </a:p>
-        </p:txBody>
-      </p:sp>
-      <p:sp>
-        <p:nvSpPr>
-          <p:cNvPr id="173" name="Google Shape;173;p14"/>
-          <p:cNvSpPr txBox="1"/>
-          <p:nvPr/>
-        </p:nvSpPr>
-        <p:spPr>
-          <a:xfrm>
-            <a:off x="467550" y="1131590"/>
-            <a:ext cx="8520600" cy="1584176"/>
-          </a:xfrm>
-          <a:prstGeom prst="rect">
-            <a:avLst/>
-          </a:prstGeom>
-          <a:noFill/>
-          <a:ln>
-            <a:noFill/>
-          </a:ln>
-        </p:spPr>
-        <p:txBody>
-          <a:bodyPr spcFirstLastPara="1" wrap="square" lIns="91425" tIns="91425" rIns="91425" bIns="91425" anchor="ctr" anchorCtr="0">
-            <a:noAutofit/>
-          </a:bodyPr>
-          <a:lstStyle/>
-          <a:p>
-            <a:pPr marL="0" marR="0" lvl="0" indent="0" algn="l" rtl="0">
-              <a:lnSpc>
-                <a:spcPct val="100000"/>
-              </a:lnSpc>
-              <a:spcBef>
-                <a:spcPts val="0"/>
-              </a:spcBef>
-              <a:spcAft>
-                <a:spcPts val="0"/>
-              </a:spcAft>
-              <a:buClr>
-                <a:schemeClr val="dk1"/>
-              </a:buClr>
-              <a:buSzPts val="1100"/>
-              <a:buFont typeface="Arial"/>
-              <a:buNone/>
-            </a:pPr>
-            <a:r>
-              <a:rPr lang="en-US" sz="5400" b="1" i="0" u="none" strike="noStrike" cap="none" dirty="0" err="1">
-                <a:solidFill>
-                  <a:schemeClr val="lt1"/>
-                </a:solidFill>
-                <a:latin typeface="Century Gothic"/>
-                <a:ea typeface="Century Gothic"/>
-                <a:cs typeface="Century Gothic"/>
-                <a:sym typeface="Century Gothic"/>
-              </a:rPr>
-              <a:t>Dúvidas</a:t>
-            </a:r>
-            <a:r>
-              <a:rPr lang="en-US" sz="5400" b="1" i="0" u="none" strike="noStrike" cap="none" dirty="0">
-                <a:solidFill>
-                  <a:schemeClr val="lt1"/>
-                </a:solidFill>
-                <a:latin typeface="Century Gothic"/>
-                <a:ea typeface="Century Gothic"/>
-                <a:cs typeface="Century Gothic"/>
-                <a:sym typeface="Century Gothic"/>
-              </a:rPr>
-              <a:t> </a:t>
-            </a:r>
-            <a:r>
-              <a:rPr lang="en-US" sz="5400" b="1" i="0" u="none" strike="noStrike" cap="none" dirty="0" err="1">
-                <a:solidFill>
-                  <a:schemeClr val="lt1"/>
-                </a:solidFill>
-                <a:latin typeface="Century Gothic"/>
-                <a:ea typeface="Century Gothic"/>
-                <a:cs typeface="Century Gothic"/>
-                <a:sym typeface="Century Gothic"/>
-              </a:rPr>
-              <a:t>durante</a:t>
-            </a:r>
-            <a:r>
-              <a:rPr lang="en-US" sz="5400" b="1" i="0" u="none" strike="noStrike" cap="none" dirty="0">
-                <a:solidFill>
-                  <a:schemeClr val="lt1"/>
-                </a:solidFill>
-                <a:latin typeface="Century Gothic"/>
-                <a:ea typeface="Century Gothic"/>
-                <a:cs typeface="Century Gothic"/>
-                <a:sym typeface="Century Gothic"/>
-              </a:rPr>
-              <a:t> o </a:t>
-            </a:r>
-            <a:r>
-              <a:rPr lang="en-US" sz="5400" b="1" i="0" u="none" strike="noStrike" cap="none" dirty="0" err="1">
-                <a:solidFill>
-                  <a:schemeClr val="lt1"/>
-                </a:solidFill>
-                <a:latin typeface="Century Gothic"/>
-                <a:ea typeface="Century Gothic"/>
-                <a:cs typeface="Century Gothic"/>
-                <a:sym typeface="Century Gothic"/>
-              </a:rPr>
-              <a:t>curso</a:t>
-            </a:r>
-            <a:r>
-              <a:rPr lang="en-US" sz="5400" b="1" i="0" u="none" strike="noStrike" cap="none" dirty="0">
-                <a:solidFill>
-                  <a:schemeClr val="lt1"/>
-                </a:solidFill>
-                <a:latin typeface="Century Gothic"/>
-                <a:ea typeface="Century Gothic"/>
-                <a:cs typeface="Century Gothic"/>
-                <a:sym typeface="Century Gothic"/>
-              </a:rPr>
-              <a:t>?</a:t>
-            </a:r>
-            <a:endParaRPr sz="5400" b="1" i="0" u="none" strike="noStrike" cap="none" dirty="0">
-              <a:solidFill>
-                <a:schemeClr val="lt1"/>
-              </a:solidFill>
-              <a:latin typeface="Century Gothic"/>
-              <a:ea typeface="Century Gothic"/>
-              <a:cs typeface="Century Gothic"/>
-              <a:sym typeface="Century Gothic"/>
-            </a:endParaRPr>
-          </a:p>
-        </p:txBody>
-      </p:sp>
-      <p:sp>
-        <p:nvSpPr>
-          <p:cNvPr id="174" name="Google Shape;174;p14"/>
-          <p:cNvSpPr txBox="1"/>
-          <p:nvPr/>
-        </p:nvSpPr>
-        <p:spPr>
-          <a:xfrm>
-            <a:off x="311700" y="1333492"/>
-            <a:ext cx="7860700" cy="3182474"/>
-          </a:xfrm>
-          <a:prstGeom prst="rect">
-            <a:avLst/>
-          </a:prstGeom>
-          <a:noFill/>
-          <a:ln>
-            <a:noFill/>
-          </a:ln>
-        </p:spPr>
-        <p:txBody>
-          <a:bodyPr spcFirstLastPara="1" wrap="square" lIns="91425" tIns="91425" rIns="91425" bIns="91425" anchor="ctr" anchorCtr="0">
-            <a:noAutofit/>
-          </a:bodyPr>
-          <a:lstStyle/>
-          <a:p>
-            <a:pPr marL="457200" marR="0" lvl="0" indent="-387350" algn="l" rtl="0">
-              <a:lnSpc>
-                <a:spcPct val="100000"/>
-              </a:lnSpc>
-              <a:spcBef>
-                <a:spcPts val="0"/>
-              </a:spcBef>
-              <a:spcAft>
-                <a:spcPts val="0"/>
-              </a:spcAft>
-              <a:buClr>
-                <a:schemeClr val="dk1"/>
-              </a:buClr>
-              <a:buSzPts val="1100"/>
-              <a:buFont typeface="Courier New"/>
-              <a:buNone/>
-            </a:pPr>
-            <a:endParaRPr sz="2400" b="0" i="0" u="none" strike="noStrike" cap="none">
-              <a:solidFill>
-                <a:schemeClr val="lt1"/>
-              </a:solidFill>
-              <a:latin typeface="Proxima Nova"/>
-              <a:ea typeface="Proxima Nova"/>
-              <a:cs typeface="Proxima Nova"/>
-              <a:sym typeface="Proxima Nova"/>
-            </a:endParaRPr>
-          </a:p>
-        </p:txBody>
-      </p:sp>
-      <p:sp>
-        <p:nvSpPr>
-          <p:cNvPr id="175" name="Google Shape;175;p14"/>
-          <p:cNvSpPr txBox="1"/>
-          <p:nvPr/>
-        </p:nvSpPr>
-        <p:spPr>
-          <a:xfrm>
-            <a:off x="467544" y="2787774"/>
-            <a:ext cx="6192688" cy="1656184"/>
-          </a:xfrm>
-          <a:prstGeom prst="rect">
-            <a:avLst/>
-          </a:prstGeom>
-          <a:noFill/>
-          <a:ln>
-            <a:noFill/>
-          </a:ln>
-        </p:spPr>
-        <p:txBody>
-          <a:bodyPr spcFirstLastPara="1" wrap="square" lIns="91425" tIns="91425" rIns="91425" bIns="91425" anchor="ctr" anchorCtr="0">
-            <a:noAutofit/>
-          </a:bodyPr>
-          <a:lstStyle/>
-          <a:p>
-            <a:pPr marL="0" marR="0" lvl="0" indent="0" algn="l" rtl="0">
-              <a:lnSpc>
-                <a:spcPct val="100000"/>
-              </a:lnSpc>
-              <a:spcBef>
-                <a:spcPts val="0"/>
-              </a:spcBef>
-              <a:spcAft>
-                <a:spcPts val="0"/>
-              </a:spcAft>
-              <a:buNone/>
-            </a:pPr>
-            <a:r>
-              <a:rPr lang="en-US" sz="2800" b="0" i="0" u="sng" strike="noStrike" cap="none" dirty="0">
-                <a:solidFill>
-                  <a:srgbClr val="F78321"/>
-                </a:solidFill>
-                <a:latin typeface="Century Gothic"/>
-                <a:ea typeface="Century Gothic"/>
-                <a:cs typeface="Century Gothic"/>
-                <a:sym typeface="Century Gothic"/>
-              </a:rPr>
-              <a:t>&gt; </a:t>
-            </a:r>
-            <a:r>
-              <a:rPr lang="en-US" sz="2800" b="0" i="0" u="sng" strike="noStrike" cap="none" dirty="0" err="1">
-                <a:solidFill>
-                  <a:srgbClr val="F78321"/>
-                </a:solidFill>
-                <a:latin typeface="Century Gothic"/>
-                <a:ea typeface="Century Gothic"/>
-                <a:cs typeface="Century Gothic"/>
-                <a:sym typeface="Century Gothic"/>
-              </a:rPr>
-              <a:t>Fórum</a:t>
-            </a:r>
-            <a:r>
-              <a:rPr lang="en-US" sz="2800" b="0" i="0" u="sng" strike="noStrike" cap="none" dirty="0">
-                <a:solidFill>
-                  <a:srgbClr val="F78321"/>
-                </a:solidFill>
-                <a:latin typeface="Century Gothic"/>
-                <a:ea typeface="Century Gothic"/>
-                <a:cs typeface="Century Gothic"/>
-                <a:sym typeface="Century Gothic"/>
-              </a:rPr>
-              <a:t> do </a:t>
-            </a:r>
-            <a:r>
-              <a:rPr lang="en-US" sz="2800" b="0" i="0" u="sng" strike="noStrike" cap="none" dirty="0" err="1">
-                <a:solidFill>
-                  <a:srgbClr val="F78321"/>
-                </a:solidFill>
-                <a:latin typeface="Century Gothic"/>
-                <a:ea typeface="Century Gothic"/>
-                <a:cs typeface="Century Gothic"/>
-                <a:sym typeface="Century Gothic"/>
-              </a:rPr>
-              <a:t>curso</a:t>
-            </a:r>
-            <a:endParaRPr u="sng" dirty="0"/>
-          </a:p>
-          <a:p>
-            <a:pPr marL="0" marR="0" lvl="0" indent="0" algn="l" rtl="0">
-              <a:lnSpc>
-                <a:spcPct val="100000"/>
-              </a:lnSpc>
-              <a:spcBef>
-                <a:spcPts val="0"/>
-              </a:spcBef>
-              <a:spcAft>
-                <a:spcPts val="0"/>
-              </a:spcAft>
-              <a:buNone/>
-            </a:pPr>
-            <a:r>
-              <a:rPr lang="en-US" sz="2800" b="0" i="0" u="sng" strike="noStrike" cap="none" dirty="0">
-                <a:solidFill>
-                  <a:srgbClr val="F78321"/>
-                </a:solidFill>
-                <a:latin typeface="Century Gothic"/>
-                <a:ea typeface="Century Gothic"/>
-                <a:cs typeface="Century Gothic"/>
-                <a:sym typeface="Century Gothic"/>
-              </a:rPr>
-              <a:t>&gt; </a:t>
-            </a:r>
-            <a:r>
-              <a:rPr lang="en-US" sz="2800" b="0" i="0" u="sng" strike="noStrike" cap="none" dirty="0" err="1">
-                <a:solidFill>
-                  <a:srgbClr val="F78321"/>
-                </a:solidFill>
-                <a:latin typeface="Century Gothic"/>
-                <a:ea typeface="Century Gothic"/>
-                <a:cs typeface="Century Gothic"/>
-                <a:sym typeface="Century Gothic"/>
-              </a:rPr>
-              <a:t>Comunidade</a:t>
-            </a:r>
-            <a:r>
-              <a:rPr lang="en-US" sz="2800" b="0" i="0" u="sng" strike="noStrike" cap="none" dirty="0">
-                <a:solidFill>
-                  <a:srgbClr val="F78321"/>
-                </a:solidFill>
-                <a:latin typeface="Century Gothic"/>
-                <a:ea typeface="Century Gothic"/>
-                <a:cs typeface="Century Gothic"/>
-                <a:sym typeface="Century Gothic"/>
-              </a:rPr>
-              <a:t> </a:t>
-            </a:r>
-            <a:r>
-              <a:rPr lang="en-US" sz="2800" b="0" i="0" u="sng" strike="noStrike" cap="none" dirty="0">
-                <a:solidFill>
-                  <a:srgbClr val="F78321"/>
-                </a:solidFill>
-                <a:latin typeface="Century Gothic"/>
-                <a:ea typeface="Century Gothic"/>
-                <a:cs typeface="Century Gothic"/>
-                <a:sym typeface="Century Gothic"/>
-                <a:hlinkClick r:id="rId4">
-                  <a:extLst>
-                    <a:ext uri="{A12FA001-AC4F-418D-AE19-62706E023703}">
-                      <ahyp:hlinkClr xmlns:ahyp="http://schemas.microsoft.com/office/drawing/2018/hyperlinkcolor" val="tx"/>
-                    </a:ext>
-                  </a:extLst>
-                </a:hlinkClick>
-              </a:rPr>
-              <a:t>online (discord)</a:t>
-            </a:r>
-            <a:endParaRPr sz="2800" b="0" i="0" u="sng" strike="noStrike" cap="none" dirty="0">
-              <a:solidFill>
-                <a:srgbClr val="F78321"/>
-              </a:solidFill>
-              <a:latin typeface="Century Gothic"/>
-              <a:ea typeface="Century Gothic"/>
-              <a:cs typeface="Century Gothic"/>
-              <a:sym typeface="Century Gothic"/>
-            </a:endParaRPr>
-          </a:p>
-        </p:txBody>
-      </p:sp>
-      <p:pic>
-        <p:nvPicPr>
-          <p:cNvPr id="7" name="Imagem 6">
-            <a:extLst>
-              <a:ext uri="{FF2B5EF4-FFF2-40B4-BE49-F238E27FC236}">
-                <a16:creationId xmlns:a16="http://schemas.microsoft.com/office/drawing/2014/main" id="{7AEB64A7-0235-496B-88BD-C863AAD3C8E1}"/>
-              </a:ext>
-            </a:extLst>
-          </p:cNvPr>
-          <p:cNvPicPr>
-            <a:picLocks noChangeAspect="1"/>
-          </p:cNvPicPr>
-          <p:nvPr/>
-        </p:nvPicPr>
-        <p:blipFill>
-          <a:blip r:embed="rId5"/>
-          <a:stretch>
-            <a:fillRect/>
-          </a:stretch>
-        </p:blipFill>
-        <p:spPr>
-          <a:xfrm>
-            <a:off x="7196362" y="2461450"/>
-            <a:ext cx="1938293" cy="2349447"/>
-          </a:xfrm>
-          <a:prstGeom prst="rect">
-            <a:avLst/>
-          </a:prstGeom>
-        </p:spPr>
-      </p:pic>
-    </p:spTree>
-  </p:cSld>
-  <p:clrMapOvr>
-    <a:masterClrMapping/>
-  </p:clrMapOvr>
-  <mc:AlternateContent xmlns:mc="http://schemas.openxmlformats.org/markup-compatibility/2006" xmlns:p14="http://schemas.microsoft.com/office/powerpoint/2010/main">
-    <mc:Choice Requires="p14">
-      <p:transition spd="med" p14:dur="700">
-        <p:fade/>
-      </p:transition>
-    </mc:Choice>
-    <mc:Fallback xmlns="" xmlns:mv="urn:schemas-microsoft-com:mac:vml" xmlns:c="http://schemas.openxmlformats.org/drawingml/2006/chart" xmlns:dgm="http://schemas.openxmlformats.org/drawingml/2006/diagram" xmlns:o="urn:schemas-microsoft-com:office:office" xmlns:v="urn:schemas-microsoft-com:vml" xmlns:pvml="urn:schemas-microsoft-com:office:powerpoint" xmlns:com="http://schemas.openxmlformats.org/drawingml/2006/compatibility" xmlns:p15="http://schemas.microsoft.com/office/powerpoint/2012/main" xmlns:ahyp="http://schemas.microsoft.com/office/drawing/2018/hyperlinkcolor">
-      <p:transition spd="slow">
-        <p:fade/>
-      </p:transition>
-    </mc:Fallback>
-  </mc:AlternateContent>
-  <p:timing>
-    <p:tnLst>
-      <p:par>
-        <p:cTn id="1" dur="indefinite" restart="never" nodeType="tmRoot">
-          <p:childTnLst>
-            <p:seq concurrent="1" nextAc="seek">
-              <p:cTn id="2" dur="indefinite" nodeType="mainSeq">
-                <p:childTnLst>
-                  <p:par>
-                    <p:cTn id="3" fill="hold">
-                      <p:stCondLst>
-                        <p:cond delay="indefinite"/>
-                      </p:stCondLst>
-                      <p:childTnLst>
-                        <p:par>
-                          <p:cTn id="4" fill="hold">
-                            <p:stCondLst>
-                              <p:cond delay="0"/>
-                            </p:stCondLst>
-                            <p:childTnLst>
-                              <p:par>
-                                <p:cTn id="5" presetID="1" presetClass="entr" presetSubtype="0" fill="hold" nodeType="clickEffect">
-                                  <p:stCondLst>
-                                    <p:cond delay="0"/>
-                                  </p:stCondLst>
-                                  <p:childTnLst>
-                                    <p:set>
-                                      <p:cBhvr>
-                                        <p:cTn id="6" dur="1" fill="hold">
-                                          <p:stCondLst>
-                                            <p:cond delay="0"/>
-                                          </p:stCondLst>
-                                        </p:cTn>
-                                        <p:tgtEl>
-                                          <p:spTgt spid="174">
-                                            <p:txEl>
-                                              <p:pRg st="0" end="0"/>
-                                            </p:txEl>
-                                          </p:spTgt>
-                                        </p:tgtEl>
-                                        <p:attrNameLst>
-                                          <p:attrName>style.visibility</p:attrName>
-                                        </p:attrNameLst>
-                                      </p:cBhvr>
-                                      <p:to>
-                                        <p:strVal val="visible"/>
-                                      </p:to>
-                                    </p:set>
-                                  </p:childTnLst>
-                                </p:cTn>
-                              </p:par>
-                            </p:childTnLst>
-                          </p:cTn>
-                        </p:par>
-                      </p:childTnLst>
-                    </p:cTn>
-                  </p:par>
-                </p:childTnLst>
-              </p:cTn>
-              <p:prevCondLst>
-                <p:cond evt="onPrev" delay="0">
-                  <p:tgtEl>
-                    <p:sldTgt/>
-                  </p:tgtEl>
-                </p:cond>
-              </p:prevCondLst>
-              <p:nextCondLst>
-                <p:cond evt="onNext" delay="0">
-                  <p:tgtEl>
-                    <p:sldTgt/>
-                  </p:tgtEl>
-                </p:cond>
-              </p:nextCondLst>
-            </p:seq>
-          </p:childTnLst>
-        </p:cTn>
-      </p:par>
-    </p:tnLst>
-  </p:timing>
 </p:sld>
 </file>
 

</xml_diff>